<commit_message>
AWS database Poster AWS
</commit_message>
<xml_diff>
--- a/02228 - Fault-Tolerant Systems/Ideas/Cloud Computing/Poster/Portrait Poster.pptx
+++ b/02228 - Fault-Tolerant Systems/Ideas/Cloud Computing/Poster/Portrait Poster.pptx
@@ -2,16 +2,16 @@
 <file path=ppt/presentation.xml><?xml version="1.0" encoding="utf-8"?>
 <p:presentation xmlns:a="http://schemas.openxmlformats.org/drawingml/2006/main" xmlns:r="http://schemas.openxmlformats.org/officeDocument/2006/relationships" xmlns:p="http://schemas.openxmlformats.org/presentationml/2006/main">
   <p:sldMasterIdLst>
-    <p:sldMasterId id="2147483648" r:id="rId5"/>
+    <p:sldMasterId id="2147483648" r:id="rId1"/>
   </p:sldMasterIdLst>
   <p:notesMasterIdLst>
-    <p:notesMasterId r:id="rId7"/>
+    <p:notesMasterId r:id="rId6"/>
   </p:notesMasterIdLst>
   <p:sldIdLst>
-    <p:sldId id="256" r:id="rId8"/>
-    <p:sldId id="257" r:id="rId9"/>
-    <p:sldId id="258" r:id="rId10"/>
-    <p:sldId id="259" r:id="rId11"/>
+    <p:sldId id="256" r:id="rId2"/>
+    <p:sldId id="257" r:id="rId3"/>
+    <p:sldId id="258" r:id="rId4"/>
+    <p:sldId id="259" r:id="rId5"/>
   </p:sldIdLst>
   <p:sldSz cx="21386800" cy="30276800"/>
   <p:notesSz cx="6858000" cy="9144000"/>
@@ -92,13 +92,14 @@
 </p:presentation>
 </file>
 
-<file path=ppt/commentAuthors.xml><?xml version="1.0" encoding="utf-8"?>
-<p:cmAuthorLst xmlns:a="http://schemas.openxmlformats.org/drawingml/2006/main" xmlns:r="http://schemas.openxmlformats.org/officeDocument/2006/relationships" xmlns:p="http://schemas.openxmlformats.org/presentationml/2006/main"/>
-</file>
-
 <file path=ppt/notesMasters/notesMaster1.xml><?xml version="1.0" encoding="utf-8"?>
 <p:notesMaster xmlns:a="http://schemas.openxmlformats.org/drawingml/2006/main" xmlns:r="http://schemas.openxmlformats.org/officeDocument/2006/relationships" xmlns:p="http://schemas.openxmlformats.org/presentationml/2006/main">
   <p:cSld>
+    <p:bg>
+      <p:bgRef idx="1001">
+        <a:schemeClr val="bg1"/>
+      </p:bgRef>
+    </p:bg>
     <p:spTree>
       <p:nvGrpSpPr>
         <p:cNvPr id="1" name=""/>
@@ -116,7 +117,9 @@
       <p:sp>
         <p:nvSpPr>
           <p:cNvPr id="3" name="Shape 3"/>
-          <p:cNvSpPr/>
+          <p:cNvSpPr>
+            <a:spLocks noGrp="1" noRot="1" noChangeAspect="1"/>
+          </p:cNvSpPr>
           <p:nvPr>
             <p:ph type="sldImg"/>
           </p:nvPr>
@@ -135,13 +138,16 @@
           <a:lstStyle/>
           <a:p>
             <a:pPr lvl="0"/>
+            <a:endParaRPr/>
           </a:p>
         </p:txBody>
       </p:sp>
       <p:sp>
         <p:nvSpPr>
           <p:cNvPr id="4" name="Shape 4"/>
-          <p:cNvSpPr/>
+          <p:cNvSpPr>
+            <a:spLocks noGrp="1"/>
+          </p:cNvSpPr>
           <p:nvPr>
             <p:ph type="body" sz="quarter" idx="1"/>
           </p:nvPr>
@@ -160,10 +166,16 @@
           <a:lstStyle/>
           <a:p>
             <a:pPr lvl="0"/>
+            <a:endParaRPr/>
           </a:p>
         </p:txBody>
       </p:sp>
     </p:spTree>
+    <p:extLst>
+      <p:ext uri="{BB962C8B-B14F-4D97-AF65-F5344CB8AC3E}">
+        <p14:creationId xmlns:p14="http://schemas.microsoft.com/office/powerpoint/2010/main" val="1909681268"/>
+      </p:ext>
+    </p:extLst>
   </p:cSld>
   <p:clrMap bg1="lt1" tx1="dk1" bg2="lt2" tx2="dk2" accent1="accent1" accent2="accent2" accent3="accent3" accent4="accent4" accent5="accent5" accent6="accent6" hlink="hlink" folHlink="folHlink"/>
   <p:notesStyle>
@@ -271,7 +283,7 @@
 </file>
 
 <file path=ppt/notesSlides/notesSlide1.xml><?xml version="1.0" encoding="utf-8"?>
-<p:notes xmlns:a="http://schemas.openxmlformats.org/drawingml/2006/main" xmlns:r="http://schemas.openxmlformats.org/officeDocument/2006/relationships" xmlns:p="http://schemas.openxmlformats.org/presentationml/2006/main" showMasterSp="1" showMasterPhAnim="1">
+<p:notes xmlns:a="http://schemas.openxmlformats.org/drawingml/2006/main" xmlns:r="http://schemas.openxmlformats.org/officeDocument/2006/relationships" xmlns:p="http://schemas.openxmlformats.org/presentationml/2006/main">
   <p:cSld>
     <p:spTree>
       <p:nvGrpSpPr>
@@ -290,12 +302,18 @@
       <p:sp>
         <p:nvSpPr>
           <p:cNvPr id="33" name="Shape 33"/>
-          <p:cNvSpPr/>
+          <p:cNvSpPr>
+            <a:spLocks noGrp="1" noRot="1" noChangeAspect="1"/>
+          </p:cNvSpPr>
           <p:nvPr>
             <p:ph type="sldImg"/>
           </p:nvPr>
         </p:nvSpPr>
         <p:spPr>
+          <a:xfrm>
+            <a:off x="2217738" y="685800"/>
+            <a:ext cx="2422525" cy="3429000"/>
+          </a:xfrm>
           <a:prstGeom prst="rect">
             <a:avLst/>
           </a:prstGeom>
@@ -305,13 +323,16 @@
           <a:lstStyle/>
           <a:p>
             <a:pPr lvl="0"/>
+            <a:endParaRPr/>
           </a:p>
         </p:txBody>
       </p:sp>
       <p:sp>
         <p:nvSpPr>
           <p:cNvPr id="34" name="Shape 34"/>
-          <p:cNvSpPr/>
+          <p:cNvSpPr>
+            <a:spLocks noGrp="1"/>
+          </p:cNvSpPr>
           <p:nvPr>
             <p:ph type="body" sz="quarter" idx="1"/>
           </p:nvPr>
@@ -359,7 +380,7 @@
 </file>
 
 <file path=ppt/slideLayouts/slideLayout1.xml><?xml version="1.0" encoding="utf-8"?>
-<p:sldLayout xmlns:a="http://schemas.openxmlformats.org/drawingml/2006/main" xmlns:r="http://schemas.openxmlformats.org/officeDocument/2006/relationships" xmlns:p="http://schemas.openxmlformats.org/presentationml/2006/main" type="tx" showMasterSp="1" showMasterPhAnim="1">
+<p:sldLayout xmlns:a="http://schemas.openxmlformats.org/drawingml/2006/main" xmlns:r="http://schemas.openxmlformats.org/officeDocument/2006/relationships" xmlns:p="http://schemas.openxmlformats.org/presentationml/2006/main" type="tx">
   <p:cSld name="Default">
     <p:spTree>
       <p:nvGrpSpPr>
@@ -380,7 +401,7 @@
   <p:clrMapOvr>
     <a:masterClrMapping/>
   </p:clrMapOvr>
-  <p:transition spd="med" advClick="1"/>
+  <p:transition xmlns:p14="http://schemas.microsoft.com/office/powerpoint/2010/main" spd="med"/>
 </p:sldLayout>
 </file>
 
@@ -392,6 +413,7 @@
         <a:solidFill>
           <a:srgbClr val="FFFFFF"/>
         </a:solidFill>
+        <a:effectLst/>
       </p:bgPr>
     </p:bg>
     <p:spTree>
@@ -412,16 +434,16 @@
   </p:cSld>
   <p:clrMap bg1="lt1" tx1="dk1" bg2="lt2" tx2="dk2" accent1="accent1" accent2="accent2" accent3="accent3" accent4="accent4" accent5="accent5" accent6="accent6" hlink="hlink" folHlink="folHlink"/>
   <p:sldLayoutIdLst>
-    <p:sldLayoutId id="2147483649" r:id="rId2"/>
+    <p:sldLayoutId id="2147483649" r:id="rId1"/>
   </p:sldLayoutIdLst>
-  <p:transition spd="med" advClick="1"/>
+  <p:transition xmlns:p14="http://schemas.microsoft.com/office/powerpoint/2010/main" spd="med"/>
   <p:txStyles>
     <p:titleStyle>
       <a:lvl1pPr defTabSz="622300">
         <a:lnSpc>
           <a:spcPts val="13000"/>
         </a:lnSpc>
-        <a:defRPr b="1" sz="12000">
+        <a:defRPr sz="12000" b="1">
           <a:solidFill>
             <a:srgbClr val="707173"/>
           </a:solidFill>
@@ -435,7 +457,7 @@
         <a:lnSpc>
           <a:spcPts val="13000"/>
         </a:lnSpc>
-        <a:defRPr b="1" sz="12000">
+        <a:defRPr sz="12000" b="1">
           <a:solidFill>
             <a:srgbClr val="707173"/>
           </a:solidFill>
@@ -449,7 +471,7 @@
         <a:lnSpc>
           <a:spcPts val="13000"/>
         </a:lnSpc>
-        <a:defRPr b="1" sz="12000">
+        <a:defRPr sz="12000" b="1">
           <a:solidFill>
             <a:srgbClr val="707173"/>
           </a:solidFill>
@@ -463,7 +485,7 @@
         <a:lnSpc>
           <a:spcPts val="13000"/>
         </a:lnSpc>
-        <a:defRPr b="1" sz="12000">
+        <a:defRPr sz="12000" b="1">
           <a:solidFill>
             <a:srgbClr val="707173"/>
           </a:solidFill>
@@ -477,7 +499,7 @@
         <a:lnSpc>
           <a:spcPts val="13000"/>
         </a:lnSpc>
-        <a:defRPr b="1" sz="12000">
+        <a:defRPr sz="12000" b="1">
           <a:solidFill>
             <a:srgbClr val="707173"/>
           </a:solidFill>
@@ -491,7 +513,7 @@
         <a:lnSpc>
           <a:spcPts val="13000"/>
         </a:lnSpc>
-        <a:defRPr b="1" sz="12000">
+        <a:defRPr sz="12000" b="1">
           <a:solidFill>
             <a:srgbClr val="707173"/>
           </a:solidFill>
@@ -505,7 +527,7 @@
         <a:lnSpc>
           <a:spcPts val="13000"/>
         </a:lnSpc>
-        <a:defRPr b="1" sz="12000">
+        <a:defRPr sz="12000" b="1">
           <a:solidFill>
             <a:srgbClr val="707173"/>
           </a:solidFill>
@@ -519,7 +541,7 @@
         <a:lnSpc>
           <a:spcPts val="13000"/>
         </a:lnSpc>
-        <a:defRPr b="1" sz="12000">
+        <a:defRPr sz="12000" b="1">
           <a:solidFill>
             <a:srgbClr val="707173"/>
           </a:solidFill>
@@ -533,7 +555,7 @@
         <a:lnSpc>
           <a:spcPts val="13000"/>
         </a:lnSpc>
-        <a:defRPr b="1" sz="12000">
+        <a:defRPr sz="12000" b="1">
           <a:solidFill>
             <a:srgbClr val="707173"/>
           </a:solidFill>
@@ -549,7 +571,7 @@
         <a:lnSpc>
           <a:spcPts val="5000"/>
         </a:lnSpc>
-        <a:defRPr b="1" sz="4000">
+        <a:defRPr sz="4000" b="1">
           <a:solidFill>
             <a:srgbClr val="707173"/>
           </a:solidFill>
@@ -563,7 +585,7 @@
         <a:lnSpc>
           <a:spcPts val="5000"/>
         </a:lnSpc>
-        <a:defRPr b="1" sz="4000">
+        <a:defRPr sz="4000" b="1">
           <a:solidFill>
             <a:srgbClr val="707173"/>
           </a:solidFill>
@@ -579,7 +601,7 @@
         </a:lnSpc>
         <a:buSzPct val="100000"/>
         <a:buChar char="•"/>
-        <a:defRPr b="1" sz="4000">
+        <a:defRPr sz="4000" b="1">
           <a:solidFill>
             <a:srgbClr val="707173"/>
           </a:solidFill>
@@ -595,7 +617,7 @@
         </a:lnSpc>
         <a:buSzPct val="100000"/>
         <a:buChar char="•"/>
-        <a:defRPr b="1" sz="4000">
+        <a:defRPr sz="4000" b="1">
           <a:solidFill>
             <a:srgbClr val="707173"/>
           </a:solidFill>
@@ -611,7 +633,7 @@
         </a:lnSpc>
         <a:buSzPct val="100000"/>
         <a:buChar char="•"/>
-        <a:defRPr b="1" sz="4000">
+        <a:defRPr sz="4000" b="1">
           <a:solidFill>
             <a:srgbClr val="707173"/>
           </a:solidFill>
@@ -627,7 +649,7 @@
         </a:lnSpc>
         <a:buSzPct val="100000"/>
         <a:buChar char="•"/>
-        <a:defRPr b="1" sz="4000">
+        <a:defRPr sz="4000" b="1">
           <a:solidFill>
             <a:srgbClr val="707173"/>
           </a:solidFill>
@@ -643,7 +665,7 @@
         </a:lnSpc>
         <a:buSzPct val="100000"/>
         <a:buChar char="•"/>
-        <a:defRPr b="1" sz="4000">
+        <a:defRPr sz="4000" b="1">
           <a:solidFill>
             <a:srgbClr val="707173"/>
           </a:solidFill>
@@ -659,7 +681,7 @@
         </a:lnSpc>
         <a:buSzPct val="100000"/>
         <a:buChar char="•"/>
-        <a:defRPr b="1" sz="4000">
+        <a:defRPr sz="4000" b="1">
           <a:solidFill>
             <a:srgbClr val="707173"/>
           </a:solidFill>
@@ -675,7 +697,7 @@
         </a:lnSpc>
         <a:buSzPct val="100000"/>
         <a:buChar char="•"/>
-        <a:defRPr b="1" sz="4000">
+        <a:defRPr sz="4000" b="1">
           <a:solidFill>
             <a:srgbClr val="707173"/>
           </a:solidFill>
@@ -792,7 +814,7 @@
 </file>
 
 <file path=ppt/slides/slide1.xml><?xml version="1.0" encoding="utf-8"?>
-<p:sld xmlns:a="http://schemas.openxmlformats.org/drawingml/2006/main" xmlns:r="http://schemas.openxmlformats.org/officeDocument/2006/relationships" xmlns:p="http://schemas.openxmlformats.org/presentationml/2006/main" showMasterSp="1" showMasterPhAnim="1">
+<p:sld xmlns:a="http://schemas.openxmlformats.org/drawingml/2006/main" xmlns:r="http://schemas.openxmlformats.org/officeDocument/2006/relationships" xmlns:p="http://schemas.openxmlformats.org/presentationml/2006/main">
   <p:cSld>
     <p:spTree>
       <p:nvGrpSpPr>
@@ -838,6 +860,7 @@
             <a:pPr lvl="0" defTabSz="457200">
               <a:defRPr sz="1800"/>
             </a:pPr>
+            <a:endParaRPr/>
           </a:p>
         </p:txBody>
       </p:sp>
@@ -874,6 +897,7 @@
                 <a:sym typeface="Helvetica"/>
               </a:defRPr>
             </a:pPr>
+            <a:endParaRPr/>
           </a:p>
         </p:txBody>
       </p:sp>
@@ -910,6 +934,7 @@
                 <a:sym typeface="Helvetica"/>
               </a:defRPr>
             </a:pPr>
+            <a:endParaRPr/>
           </a:p>
         </p:txBody>
       </p:sp>
@@ -1034,7 +1059,9 @@
       <p:sp>
         <p:nvSpPr>
           <p:cNvPr id="12" name="Shape 12"/>
-          <p:cNvSpPr/>
+          <p:cNvSpPr>
+            <a:spLocks noGrp="1"/>
+          </p:cNvSpPr>
           <p:nvPr>
             <p:ph type="title" idx="4294967295"/>
           </p:nvPr>
@@ -1058,7 +1085,7 @@
         </p:spPr>
         <p:txBody>
           <a:bodyPr lIns="0" tIns="0" rIns="0" bIns="0">
-            <a:normAutofit fontScale="100000" lnSpcReduction="0"/>
+            <a:normAutofit/>
           </a:bodyPr>
           <a:lstStyle/>
           <a:p>
@@ -1066,14 +1093,14 @@
               <a:lnSpc>
                 <a:spcPct val="100000"/>
               </a:lnSpc>
-              <a:defRPr b="0" sz="1800">
+              <a:defRPr sz="1800" b="0">
                 <a:solidFill>
                   <a:srgbClr val="000000"/>
                 </a:solidFill>
               </a:defRPr>
             </a:pPr>
             <a:r>
-              <a:rPr b="1" sz="9000">
+              <a:rPr sz="9000" b="1">
                 <a:solidFill>
                   <a:srgbClr val="707173"/>
                 </a:solidFill>
@@ -1081,7 +1108,7 @@
               <a:t>Fault-Tolerant Cloud Computing Architectures 				</a:t>
             </a:r>
             <a:r>
-              <a:rPr b="1" sz="6000">
+              <a:rPr sz="6000" b="1">
                 <a:solidFill>
                   <a:srgbClr val="BD2A33"/>
                 </a:solidFill>
@@ -1094,7 +1121,9 @@
       <p:sp>
         <p:nvSpPr>
           <p:cNvPr id="13" name="Shape 13"/>
-          <p:cNvSpPr/>
+          <p:cNvSpPr>
+            <a:spLocks noGrp="1"/>
+          </p:cNvSpPr>
           <p:nvPr>
             <p:ph type="body" idx="4294967295"/>
           </p:nvPr>
@@ -1118,7 +1147,7 @@
         </p:spPr>
         <p:txBody>
           <a:bodyPr lIns="0" tIns="0" rIns="0" bIns="0">
-            <a:normAutofit fontScale="100000" lnSpcReduction="0"/>
+            <a:normAutofit/>
           </a:bodyPr>
           <a:lstStyle>
             <a:lvl1pPr marL="0" indent="0" algn="ctr">
@@ -1127,14 +1156,14 @@
           </a:lstStyle>
           <a:p>
             <a:pPr lvl="0">
-              <a:defRPr b="0" sz="1800">
+              <a:defRPr sz="1800" b="0">
                 <a:solidFill>
                   <a:srgbClr val="000000"/>
                 </a:solidFill>
               </a:defRPr>
             </a:pPr>
             <a:r>
-              <a:rPr b="1" sz="5000">
+              <a:rPr sz="5000" b="1" dirty="0">
                 <a:solidFill>
                   <a:srgbClr val="707173"/>
                 </a:solidFill>
@@ -1176,15 +1205,15 @@
               <a:lnSpc>
                 <a:spcPts val="6800"/>
               </a:lnSpc>
-              <a:defRPr b="1" sz="4800"/>
+              <a:defRPr sz="4800" b="1"/>
             </a:lvl1pPr>
           </a:lstStyle>
           <a:p>
             <a:pPr lvl="0">
-              <a:defRPr b="0" sz="1800"/>
-            </a:pPr>
-            <a:r>
-              <a:rPr b="1" sz="4800"/>
+              <a:defRPr sz="1800" b="0"/>
+            </a:pPr>
+            <a:r>
+              <a:rPr sz="4800" b="1"/>
               <a:t>Authors: Andreas Kjeldsen (s092638), Morten Eskesen (s133334)</a:t>
             </a:r>
           </a:p>
@@ -1287,7 +1316,7 @@
         </p:blipFill>
         <p:spPr>
           <a:xfrm>
-            <a:off x="12466368" y="12466522"/>
+            <a:off x="12466368" y="14334568"/>
             <a:ext cx="6987626" cy="4829581"/>
           </a:xfrm>
           <a:prstGeom prst="rect">
@@ -1306,7 +1335,7 @@
         </p:nvSpPr>
         <p:spPr>
           <a:xfrm>
-            <a:off x="12538525" y="17409955"/>
+            <a:off x="12538525" y="19278001"/>
             <a:ext cx="4879949" cy="276540"/>
           </a:xfrm>
           <a:prstGeom prst="rect">
@@ -1327,15 +1356,15 @@
           </a:bodyPr>
           <a:lstStyle>
             <a:lvl1pPr>
-              <a:defRPr b="1" sz="1300"/>
+              <a:defRPr sz="1300" b="1"/>
             </a:lvl1pPr>
           </a:lstStyle>
           <a:p>
             <a:pPr lvl="0">
-              <a:defRPr b="0" sz="1800"/>
-            </a:pPr>
-            <a:r>
-              <a:rPr b="1" sz="1300"/>
+              <a:defRPr sz="1800" b="0"/>
+            </a:pPr>
+            <a:r>
+              <a:rPr sz="1300" b="1" dirty="0"/>
               <a:t>Google Web Application Architecture on Google App Engine </a:t>
             </a:r>
           </a:p>
@@ -1357,7 +1386,7 @@
         </p:blipFill>
         <p:spPr>
           <a:xfrm>
-            <a:off x="1401392" y="11919862"/>
+            <a:off x="1408528" y="13655509"/>
             <a:ext cx="6641227" cy="5705215"/>
           </a:xfrm>
           <a:prstGeom prst="rect">
@@ -1376,7 +1405,7 @@
         </p:nvSpPr>
         <p:spPr>
           <a:xfrm>
-            <a:off x="1394256" y="17680624"/>
+            <a:off x="1401392" y="19416271"/>
             <a:ext cx="5198459" cy="276540"/>
           </a:xfrm>
           <a:prstGeom prst="rect">
@@ -1397,15 +1426,15 @@
           </a:bodyPr>
           <a:lstStyle>
             <a:lvl1pPr>
-              <a:defRPr b="1" sz="1300"/>
+              <a:defRPr sz="1300" b="1"/>
             </a:lvl1pPr>
           </a:lstStyle>
           <a:p>
             <a:pPr lvl="0">
-              <a:defRPr b="0" sz="1800"/>
-            </a:pPr>
-            <a:r>
-              <a:rPr b="1" sz="1300"/>
+              <a:defRPr sz="1800" b="0"/>
+            </a:pPr>
+            <a:r>
+              <a:rPr sz="1300" b="1" dirty="0"/>
               <a:t>Example of fault-tolerant application architecture hosted on AWS</a:t>
             </a:r>
           </a:p>
@@ -1436,14 +1465,14 @@
         </p:spPr>
         <p:txBody>
           <a:bodyPr lIns="0" tIns="0" rIns="0" bIns="0">
-            <a:normAutofit fontScale="100000" lnSpcReduction="0"/>
+            <a:normAutofit/>
           </a:bodyPr>
           <a:lstStyle>
             <a:lvl1pPr algn="ctr" defTabSz="622300">
               <a:lnSpc>
                 <a:spcPts val="5000"/>
               </a:lnSpc>
-              <a:defRPr b="1" sz="5000">
+              <a:defRPr sz="5000" b="1">
                 <a:solidFill>
                   <a:srgbClr val="707173"/>
                 </a:solidFill>
@@ -1452,14 +1481,14 @@
           </a:lstStyle>
           <a:p>
             <a:pPr lvl="0">
-              <a:defRPr b="0" sz="1800">
+              <a:defRPr sz="1800" b="0">
                 <a:solidFill>
                   <a:srgbClr val="000000"/>
                 </a:solidFill>
               </a:defRPr>
             </a:pPr>
             <a:r>
-              <a:rPr b="1" sz="5000">
+              <a:rPr sz="5000" b="1" dirty="0">
                 <a:solidFill>
                   <a:srgbClr val="707173"/>
                 </a:solidFill>
@@ -1494,14 +1523,14 @@
         </p:spPr>
         <p:txBody>
           <a:bodyPr lIns="0" tIns="0" rIns="0" bIns="0">
-            <a:normAutofit fontScale="100000" lnSpcReduction="0"/>
+            <a:normAutofit/>
           </a:bodyPr>
           <a:lstStyle>
             <a:lvl1pPr algn="ctr" defTabSz="622300">
               <a:lnSpc>
                 <a:spcPts val="5000"/>
               </a:lnSpc>
-              <a:defRPr b="1" sz="5000">
+              <a:defRPr sz="5000" b="1">
                 <a:solidFill>
                   <a:srgbClr val="707173"/>
                 </a:solidFill>
@@ -1510,14 +1539,14 @@
           </a:lstStyle>
           <a:p>
             <a:pPr lvl="0">
-              <a:defRPr b="0" sz="1800">
+              <a:defRPr sz="1800" b="0">
                 <a:solidFill>
                   <a:srgbClr val="000000"/>
                 </a:solidFill>
               </a:defRPr>
             </a:pPr>
             <a:r>
-              <a:rPr b="1" sz="5000">
+              <a:rPr sz="5000" b="1">
                 <a:solidFill>
                   <a:srgbClr val="707173"/>
                 </a:solidFill>
@@ -1552,14 +1581,14 @@
         </p:spPr>
         <p:txBody>
           <a:bodyPr lIns="0" tIns="0" rIns="0" bIns="0">
-            <a:normAutofit fontScale="100000" lnSpcReduction="0"/>
+            <a:normAutofit/>
           </a:bodyPr>
           <a:lstStyle>
             <a:lvl1pPr algn="ctr" defTabSz="622300">
               <a:lnSpc>
                 <a:spcPts val="5000"/>
               </a:lnSpc>
-              <a:defRPr b="1" sz="5000">
+              <a:defRPr sz="5000" b="1">
                 <a:solidFill>
                   <a:srgbClr val="707173"/>
                 </a:solidFill>
@@ -1568,14 +1597,14 @@
           </a:lstStyle>
           <a:p>
             <a:pPr lvl="0">
-              <a:defRPr b="0" sz="1800">
+              <a:defRPr sz="1800" b="0">
                 <a:solidFill>
                   <a:srgbClr val="000000"/>
                 </a:solidFill>
               </a:defRPr>
             </a:pPr>
             <a:r>
-              <a:rPr b="1" sz="5000">
+              <a:rPr sz="5000" b="1">
                 <a:solidFill>
                   <a:srgbClr val="707173"/>
                 </a:solidFill>
@@ -1593,8 +1622,8 @@
         </p:nvSpPr>
         <p:spPr>
           <a:xfrm>
-            <a:off x="1506142" y="18130625"/>
-            <a:ext cx="1315329" cy="412500"/>
+            <a:off x="1506142" y="12123470"/>
+            <a:ext cx="6995776" cy="923330"/>
           </a:xfrm>
           <a:prstGeom prst="rect">
             <a:avLst/>
@@ -1622,8 +1651,126 @@
               <a:defRPr sz="1800"/>
             </a:pPr>
             <a:r>
-              <a:rPr sz="2200"/>
-              <a:t>Tekst her </a:t>
+              <a:rPr lang="da-DK" sz="1800" dirty="0" err="1" smtClean="0"/>
+              <a:t>Many</a:t>
+            </a:r>
+            <a:r>
+              <a:rPr lang="da-DK" sz="1800" dirty="0" smtClean="0"/>
+              <a:t> services offered. Services have </a:t>
+            </a:r>
+            <a:r>
+              <a:rPr lang="da-DK" sz="1800" dirty="0" err="1" smtClean="0"/>
+              <a:t>different</a:t>
+            </a:r>
+            <a:r>
+              <a:rPr lang="da-DK" sz="1800" dirty="0" smtClean="0"/>
+              <a:t> </a:t>
+            </a:r>
+            <a:r>
+              <a:rPr lang="da-DK" sz="1800" dirty="0" err="1" smtClean="0"/>
+              <a:t>functions</a:t>
+            </a:r>
+            <a:r>
+              <a:rPr lang="da-DK" sz="1800" dirty="0" smtClean="0"/>
+              <a:t>.</a:t>
+            </a:r>
+          </a:p>
+          <a:p>
+            <a:pPr lvl="0">
+              <a:defRPr sz="1800"/>
+            </a:pPr>
+            <a:r>
+              <a:rPr lang="da-DK" sz="1800" dirty="0" err="1" smtClean="0"/>
+              <a:t>Some</a:t>
+            </a:r>
+            <a:r>
+              <a:rPr lang="da-DK" sz="1800" dirty="0" smtClean="0"/>
+              <a:t> services </a:t>
+            </a:r>
+            <a:r>
+              <a:rPr lang="da-DK" sz="1800" dirty="0" err="1" smtClean="0"/>
+              <a:t>are</a:t>
+            </a:r>
+            <a:r>
+              <a:rPr lang="da-DK" sz="1800" dirty="0" smtClean="0"/>
+              <a:t> </a:t>
+            </a:r>
+            <a:r>
+              <a:rPr lang="da-DK" sz="1800" dirty="0" err="1" smtClean="0"/>
+              <a:t>fault</a:t>
+            </a:r>
+            <a:r>
+              <a:rPr lang="da-DK" sz="1800" dirty="0" smtClean="0"/>
+              <a:t>-tolerant by design and </a:t>
+            </a:r>
+            <a:r>
+              <a:rPr lang="da-DK" sz="1800" dirty="0" err="1" smtClean="0"/>
+              <a:t>can</a:t>
+            </a:r>
+            <a:r>
+              <a:rPr lang="da-DK" sz="1800" dirty="0" smtClean="0"/>
+              <a:t> </a:t>
+            </a:r>
+            <a:r>
+              <a:rPr lang="da-DK" sz="1800" dirty="0" err="1" smtClean="0"/>
+              <a:t>be</a:t>
+            </a:r>
+            <a:r>
+              <a:rPr lang="da-DK" sz="1800" dirty="0" smtClean="0"/>
+              <a:t> </a:t>
+            </a:r>
+            <a:r>
+              <a:rPr lang="da-DK" sz="1800" dirty="0" err="1" smtClean="0"/>
+              <a:t>connected</a:t>
+            </a:r>
+            <a:r>
+              <a:rPr lang="da-DK" sz="1800" dirty="0" smtClean="0"/>
+              <a:t> to</a:t>
+            </a:r>
+          </a:p>
+          <a:p>
+            <a:pPr lvl="0">
+              <a:defRPr sz="1800"/>
+            </a:pPr>
+            <a:r>
+              <a:rPr lang="da-DK" sz="1800" dirty="0" err="1" smtClean="0"/>
+              <a:t>Other</a:t>
+            </a:r>
+            <a:r>
+              <a:rPr lang="da-DK" sz="1800" dirty="0" smtClean="0"/>
+              <a:t> services, </a:t>
+            </a:r>
+            <a:r>
+              <a:rPr lang="da-DK" sz="1800" dirty="0" err="1" smtClean="0"/>
+              <a:t>thereby</a:t>
+            </a:r>
+            <a:r>
+              <a:rPr lang="da-DK" sz="1800" dirty="0" smtClean="0"/>
+              <a:t> </a:t>
+            </a:r>
+            <a:r>
+              <a:rPr lang="da-DK" sz="1800" dirty="0" err="1" smtClean="0"/>
+              <a:t>making</a:t>
+            </a:r>
+            <a:r>
+              <a:rPr lang="da-DK" sz="1800" dirty="0" smtClean="0"/>
+              <a:t> a </a:t>
+            </a:r>
+            <a:r>
+              <a:rPr lang="da-DK" sz="1800" dirty="0" err="1" smtClean="0"/>
+              <a:t>complete</a:t>
+            </a:r>
+            <a:r>
+              <a:rPr lang="da-DK" sz="1800" dirty="0" smtClean="0"/>
+              <a:t> </a:t>
+            </a:r>
+            <a:r>
+              <a:rPr lang="da-DK" sz="1800" dirty="0" err="1" smtClean="0"/>
+              <a:t>fault</a:t>
+            </a:r>
+            <a:r>
+              <a:rPr lang="da-DK" sz="1800" dirty="0" smtClean="0"/>
+              <a:t>-tolerant system.</a:t>
             </a:r>
           </a:p>
         </p:txBody>
@@ -1636,7 +1783,7 @@
         </p:nvSpPr>
         <p:spPr>
           <a:xfrm>
-            <a:off x="12621451" y="18130625"/>
+            <a:off x="12621451" y="12080302"/>
             <a:ext cx="1315329" cy="412500"/>
           </a:xfrm>
           <a:prstGeom prst="rect">
@@ -1665,7 +1812,7 @@
               <a:defRPr sz="1800"/>
             </a:pPr>
             <a:r>
-              <a:rPr sz="2200"/>
+              <a:rPr sz="2200" dirty="0"/>
               <a:t>Tekst her </a:t>
             </a:r>
           </a:p>
@@ -1680,7 +1827,7 @@
         <p:spPr>
           <a:xfrm>
             <a:off x="1506142" y="20630713"/>
-            <a:ext cx="1315329" cy="412500"/>
+            <a:ext cx="7661314" cy="1938992"/>
           </a:xfrm>
           <a:prstGeom prst="rect">
             <a:avLst/>
@@ -1708,9 +1855,202 @@
               <a:defRPr sz="1800"/>
             </a:pPr>
             <a:r>
-              <a:rPr sz="2200"/>
-              <a:t>Tekst her </a:t>
-            </a:r>
+              <a:rPr lang="da-DK" sz="1800" dirty="0" err="1" smtClean="0"/>
+              <a:t>Four</a:t>
+            </a:r>
+            <a:r>
+              <a:rPr lang="da-DK" sz="1800" dirty="0" smtClean="0"/>
+              <a:t> </a:t>
+            </a:r>
+            <a:r>
+              <a:rPr lang="da-DK" sz="1800" dirty="0" err="1" smtClean="0"/>
+              <a:t>different</a:t>
+            </a:r>
+            <a:r>
+              <a:rPr lang="da-DK" sz="1800" dirty="0" smtClean="0"/>
+              <a:t> </a:t>
+            </a:r>
+            <a:r>
+              <a:rPr lang="da-DK" sz="1800" dirty="0" err="1" smtClean="0"/>
+              <a:t>storage</a:t>
+            </a:r>
+            <a:r>
+              <a:rPr lang="da-DK" sz="1800" dirty="0" smtClean="0"/>
+              <a:t> services: Simple Storage Service (S3), </a:t>
+            </a:r>
+          </a:p>
+          <a:p>
+            <a:pPr lvl="0">
+              <a:defRPr sz="1800"/>
+            </a:pPr>
+            <a:r>
+              <a:rPr lang="da-DK" sz="1800" dirty="0" err="1" smtClean="0"/>
+              <a:t>Elastic</a:t>
+            </a:r>
+            <a:r>
+              <a:rPr lang="da-DK" sz="1800" dirty="0" smtClean="0"/>
+              <a:t> Block Storage (EBS), Databases (RDS, </a:t>
+            </a:r>
+            <a:r>
+              <a:rPr lang="da-DK" sz="1800" dirty="0" err="1" smtClean="0"/>
+              <a:t>DynamoDB</a:t>
+            </a:r>
+            <a:r>
+              <a:rPr lang="da-DK" sz="1800" dirty="0" smtClean="0"/>
+              <a:t> &amp; </a:t>
+            </a:r>
+            <a:r>
+              <a:rPr lang="da-DK" sz="1800" dirty="0" err="1" smtClean="0"/>
+              <a:t>SimpleDB</a:t>
+            </a:r>
+            <a:r>
+              <a:rPr lang="da-DK" sz="1800" dirty="0" smtClean="0"/>
+              <a:t>), </a:t>
+            </a:r>
+          </a:p>
+          <a:p>
+            <a:pPr lvl="0">
+              <a:defRPr sz="1800"/>
+            </a:pPr>
+            <a:r>
+              <a:rPr lang="da-DK" sz="1800" dirty="0" smtClean="0"/>
+              <a:t>EC2 </a:t>
+            </a:r>
+            <a:r>
+              <a:rPr lang="da-DK" sz="1800" dirty="0" err="1" smtClean="0"/>
+              <a:t>instances</a:t>
+            </a:r>
+            <a:r>
+              <a:rPr lang="da-DK" sz="1800" dirty="0" smtClean="0"/>
+              <a:t> with </a:t>
+            </a:r>
+            <a:r>
+              <a:rPr lang="da-DK" sz="1800" dirty="0" err="1" smtClean="0"/>
+              <a:t>SSDs</a:t>
+            </a:r>
+            <a:r>
+              <a:rPr lang="da-DK" sz="1800" dirty="0" smtClean="0"/>
+              <a:t>. </a:t>
+            </a:r>
+          </a:p>
+          <a:p>
+            <a:pPr lvl="0">
+              <a:defRPr sz="1800"/>
+            </a:pPr>
+            <a:endParaRPr lang="da-DK" dirty="0"/>
+          </a:p>
+          <a:p>
+            <a:pPr lvl="0">
+              <a:defRPr sz="1800"/>
+            </a:pPr>
+            <a:r>
+              <a:rPr lang="da-DK" dirty="0" smtClean="0"/>
+              <a:t>S3 is </a:t>
+            </a:r>
+            <a:r>
+              <a:rPr lang="da-DK" dirty="0" err="1" smtClean="0"/>
+              <a:t>highly</a:t>
+            </a:r>
+            <a:r>
+              <a:rPr lang="da-DK" dirty="0" smtClean="0"/>
+              <a:t> </a:t>
+            </a:r>
+            <a:r>
+              <a:rPr lang="da-DK" dirty="0" err="1" smtClean="0"/>
+              <a:t>available</a:t>
+            </a:r>
+            <a:r>
+              <a:rPr lang="da-DK" dirty="0" smtClean="0"/>
+              <a:t> and redundant </a:t>
+            </a:r>
+            <a:r>
+              <a:rPr lang="da-DK" dirty="0" err="1" smtClean="0"/>
+              <a:t>storage</a:t>
+            </a:r>
+            <a:r>
+              <a:rPr lang="da-DK" dirty="0" smtClean="0"/>
+              <a:t>. EBS and the databases have</a:t>
+            </a:r>
+          </a:p>
+          <a:p>
+            <a:pPr lvl="0">
+              <a:defRPr sz="1800"/>
+            </a:pPr>
+            <a:r>
+              <a:rPr lang="da-DK" dirty="0" err="1"/>
+              <a:t>r</a:t>
+            </a:r>
+            <a:r>
+              <a:rPr lang="da-DK" dirty="0" err="1" smtClean="0"/>
+              <a:t>eplication</a:t>
+            </a:r>
+            <a:r>
+              <a:rPr lang="da-DK" dirty="0" smtClean="0"/>
+              <a:t> and </a:t>
+            </a:r>
+            <a:r>
+              <a:rPr lang="da-DK" dirty="0" err="1" smtClean="0"/>
+              <a:t>can</a:t>
+            </a:r>
+            <a:r>
+              <a:rPr lang="da-DK" dirty="0" smtClean="0"/>
+              <a:t> </a:t>
+            </a:r>
+            <a:r>
+              <a:rPr lang="da-DK" dirty="0" err="1" smtClean="0"/>
+              <a:t>be</a:t>
+            </a:r>
+            <a:r>
+              <a:rPr lang="da-DK" dirty="0" smtClean="0"/>
+              <a:t> </a:t>
+            </a:r>
+            <a:r>
+              <a:rPr lang="da-DK" dirty="0" err="1" smtClean="0"/>
+              <a:t>backed</a:t>
+            </a:r>
+            <a:r>
+              <a:rPr lang="da-DK" dirty="0" smtClean="0"/>
+              <a:t> up to S3. The </a:t>
+            </a:r>
+            <a:r>
+              <a:rPr lang="da-DK" dirty="0" err="1" smtClean="0"/>
+              <a:t>SSDs</a:t>
+            </a:r>
+            <a:r>
+              <a:rPr lang="da-DK" dirty="0" smtClean="0"/>
+              <a:t> on the EC2 </a:t>
+            </a:r>
+            <a:r>
+              <a:rPr lang="da-DK" dirty="0" err="1" smtClean="0"/>
+              <a:t>instances</a:t>
+            </a:r>
+            <a:endParaRPr lang="da-DK" dirty="0" smtClean="0"/>
+          </a:p>
+          <a:p>
+            <a:pPr lvl="0">
+              <a:defRPr sz="1800"/>
+            </a:pPr>
+            <a:r>
+              <a:rPr lang="da-DK" dirty="0" err="1"/>
+              <a:t>s</a:t>
+            </a:r>
+            <a:r>
+              <a:rPr lang="da-DK" dirty="0" err="1" smtClean="0"/>
+              <a:t>hould</a:t>
+            </a:r>
+            <a:r>
+              <a:rPr lang="da-DK" dirty="0" smtClean="0"/>
+              <a:t> push data to </a:t>
+            </a:r>
+            <a:r>
+              <a:rPr lang="da-DK" dirty="0" err="1" smtClean="0"/>
+              <a:t>persist</a:t>
+            </a:r>
+            <a:r>
+              <a:rPr lang="da-DK" dirty="0" smtClean="0"/>
+              <a:t> to EBS.</a:t>
+            </a:r>
+            <a:endParaRPr lang="da-DK" dirty="0"/>
           </a:p>
         </p:txBody>
       </p:sp>
@@ -1809,7 +2149,7 @@
         <p:spPr>
           <a:xfrm>
             <a:off x="1506142" y="23134047"/>
-            <a:ext cx="1315329" cy="412500"/>
+            <a:ext cx="5504249" cy="830997"/>
           </a:xfrm>
           <a:prstGeom prst="rect">
             <a:avLst/>
@@ -1837,9 +2177,100 @@
               <a:defRPr sz="1800"/>
             </a:pPr>
             <a:r>
-              <a:rPr sz="2200"/>
-              <a:t>Tekst her </a:t>
-            </a:r>
+              <a:rPr lang="da-DK" sz="1800" dirty="0" smtClean="0"/>
+              <a:t>Multiple regions </a:t>
+            </a:r>
+            <a:r>
+              <a:rPr lang="da-DK" sz="1800" dirty="0" err="1" smtClean="0"/>
+              <a:t>available</a:t>
+            </a:r>
+            <a:r>
+              <a:rPr lang="da-DK" sz="1800" dirty="0" smtClean="0"/>
+              <a:t> </a:t>
+            </a:r>
+            <a:r>
+              <a:rPr lang="da-DK" sz="1800" dirty="0" err="1" smtClean="0"/>
+              <a:t>throughout</a:t>
+            </a:r>
+            <a:r>
+              <a:rPr lang="da-DK" sz="1800" dirty="0" smtClean="0"/>
+              <a:t> the </a:t>
+            </a:r>
+            <a:r>
+              <a:rPr lang="da-DK" sz="1800" dirty="0" err="1" smtClean="0"/>
+              <a:t>world</a:t>
+            </a:r>
+            <a:r>
+              <a:rPr lang="da-DK" sz="1800" dirty="0" smtClean="0"/>
+              <a:t>.</a:t>
+            </a:r>
+          </a:p>
+          <a:p>
+            <a:pPr lvl="0">
+              <a:defRPr sz="1800"/>
+            </a:pPr>
+            <a:r>
+              <a:rPr lang="da-DK" sz="1800" dirty="0" err="1" smtClean="0"/>
+              <a:t>Each</a:t>
+            </a:r>
+            <a:r>
+              <a:rPr lang="da-DK" sz="1800" dirty="0" smtClean="0"/>
+              <a:t> region has multiple </a:t>
+            </a:r>
+            <a:r>
+              <a:rPr lang="da-DK" sz="1800" dirty="0" err="1" smtClean="0"/>
+              <a:t>availability</a:t>
+            </a:r>
+            <a:r>
+              <a:rPr lang="da-DK" sz="1800" dirty="0" smtClean="0"/>
+              <a:t> zones.</a:t>
+            </a:r>
+          </a:p>
+          <a:p>
+            <a:pPr lvl="0">
+              <a:defRPr sz="1800"/>
+            </a:pPr>
+            <a:r>
+              <a:rPr lang="da-DK" sz="1800" dirty="0" smtClean="0"/>
+              <a:t>Resources </a:t>
+            </a:r>
+            <a:r>
+              <a:rPr lang="da-DK" sz="1800" dirty="0" err="1" smtClean="0"/>
+              <a:t>are</a:t>
+            </a:r>
+            <a:r>
+              <a:rPr lang="da-DK" sz="1800" dirty="0" smtClean="0"/>
+              <a:t> </a:t>
+            </a:r>
+            <a:r>
+              <a:rPr lang="da-DK" sz="1800" dirty="0" err="1" smtClean="0"/>
+              <a:t>replicated</a:t>
+            </a:r>
+            <a:r>
+              <a:rPr lang="da-DK" sz="1800" dirty="0" smtClean="0"/>
+              <a:t> t</a:t>
+            </a:r>
+            <a:r>
+              <a:rPr lang="da-DK" sz="1800" dirty="0" smtClean="0"/>
+              <a:t>o </a:t>
+            </a:r>
+            <a:r>
+              <a:rPr lang="da-DK" sz="1800" dirty="0" err="1" smtClean="0"/>
+              <a:t>various</a:t>
+            </a:r>
+            <a:r>
+              <a:rPr lang="da-DK" sz="1800" dirty="0" smtClean="0"/>
+              <a:t> </a:t>
+            </a:r>
+            <a:r>
+              <a:rPr lang="da-DK" sz="1800" dirty="0" err="1" smtClean="0"/>
+              <a:t>availability</a:t>
+            </a:r>
+            <a:r>
+              <a:rPr lang="da-DK" sz="1800" dirty="0" smtClean="0"/>
+              <a:t> zones.</a:t>
+            </a:r>
+            <a:endParaRPr sz="1800" dirty="0"/>
           </a:p>
         </p:txBody>
       </p:sp>
@@ -1895,7 +2326,7 @@
         <p:spPr>
           <a:xfrm>
             <a:off x="1506142" y="25793404"/>
-            <a:ext cx="1315329" cy="412501"/>
+            <a:ext cx="6903107" cy="830997"/>
           </a:xfrm>
           <a:prstGeom prst="rect">
             <a:avLst/>
@@ -1923,8 +2354,150 @@
               <a:defRPr sz="1800"/>
             </a:pPr>
             <a:r>
-              <a:rPr sz="2200"/>
-              <a:t>Tekst her </a:t>
+              <a:rPr lang="da-DK" sz="1800" dirty="0" err="1" smtClean="0"/>
+              <a:t>Distributes</a:t>
+            </a:r>
+            <a:r>
+              <a:rPr lang="da-DK" sz="1800" dirty="0" smtClean="0"/>
+              <a:t> load </a:t>
+            </a:r>
+            <a:r>
+              <a:rPr lang="da-DK" sz="1800" dirty="0" err="1" smtClean="0"/>
+              <a:t>between</a:t>
+            </a:r>
+            <a:r>
+              <a:rPr lang="da-DK" sz="1800" dirty="0" smtClean="0"/>
+              <a:t> multiple </a:t>
+            </a:r>
+            <a:r>
+              <a:rPr lang="da-DK" sz="1800" dirty="0" err="1" smtClean="0"/>
+              <a:t>computing</a:t>
+            </a:r>
+            <a:r>
+              <a:rPr lang="da-DK" sz="1800" dirty="0" smtClean="0"/>
+              <a:t> </a:t>
+            </a:r>
+            <a:r>
+              <a:rPr lang="da-DK" sz="1800" dirty="0" err="1" smtClean="0"/>
+              <a:t>instances</a:t>
+            </a:r>
+            <a:r>
+              <a:rPr lang="da-DK" sz="1800" dirty="0" smtClean="0"/>
+              <a:t>.</a:t>
+            </a:r>
+          </a:p>
+          <a:p>
+            <a:pPr lvl="0">
+              <a:defRPr sz="1800"/>
+            </a:pPr>
+            <a:r>
+              <a:rPr lang="da-DK" sz="1800" dirty="0" smtClean="0"/>
+              <a:t>Can </a:t>
+            </a:r>
+            <a:r>
+              <a:rPr lang="da-DK" sz="1800" dirty="0" err="1" smtClean="0"/>
+              <a:t>automatically</a:t>
+            </a:r>
+            <a:r>
+              <a:rPr lang="da-DK" sz="1800" dirty="0" smtClean="0"/>
+              <a:t> </a:t>
+            </a:r>
+            <a:r>
+              <a:rPr lang="da-DK" sz="1800" dirty="0" err="1" smtClean="0"/>
+              <a:t>detect</a:t>
+            </a:r>
+            <a:r>
+              <a:rPr lang="da-DK" sz="1800" dirty="0" smtClean="0"/>
+              <a:t> </a:t>
+            </a:r>
+            <a:r>
+              <a:rPr lang="da-DK" sz="1800" dirty="0" err="1" smtClean="0"/>
+              <a:t>failed</a:t>
+            </a:r>
+            <a:r>
+              <a:rPr lang="da-DK" sz="1800" dirty="0" smtClean="0"/>
+              <a:t> </a:t>
+            </a:r>
+            <a:r>
+              <a:rPr lang="da-DK" sz="1800" dirty="0" err="1" smtClean="0"/>
+              <a:t>computing</a:t>
+            </a:r>
+            <a:r>
+              <a:rPr lang="da-DK" sz="1800" dirty="0" smtClean="0"/>
+              <a:t> </a:t>
+            </a:r>
+            <a:r>
+              <a:rPr lang="da-DK" sz="1800" dirty="0" err="1" smtClean="0"/>
+              <a:t>instances</a:t>
+            </a:r>
+            <a:r>
+              <a:rPr lang="da-DK" sz="1800" dirty="0" smtClean="0"/>
+              <a:t> and </a:t>
+            </a:r>
+            <a:r>
+              <a:rPr lang="da-DK" sz="1800" dirty="0" err="1" smtClean="0"/>
+              <a:t>make</a:t>
+            </a:r>
+            <a:r>
+              <a:rPr lang="da-DK" sz="1800" dirty="0" smtClean="0"/>
+              <a:t> sure</a:t>
+            </a:r>
+          </a:p>
+          <a:p>
+            <a:pPr lvl="0">
+              <a:defRPr sz="1800"/>
+            </a:pPr>
+            <a:r>
+              <a:rPr lang="da-DK" sz="1800" dirty="0" err="1"/>
+              <a:t>t</a:t>
+            </a:r>
+            <a:r>
+              <a:rPr lang="da-DK" sz="1800" dirty="0" err="1" smtClean="0"/>
+              <a:t>raffic</a:t>
+            </a:r>
+            <a:r>
+              <a:rPr lang="da-DK" sz="1800" dirty="0" smtClean="0"/>
+              <a:t> is </a:t>
+            </a:r>
+            <a:r>
+              <a:rPr lang="da-DK" sz="1800" dirty="0" err="1" smtClean="0"/>
+              <a:t>only</a:t>
+            </a:r>
+            <a:r>
+              <a:rPr lang="da-DK" sz="1800" dirty="0" smtClean="0"/>
+              <a:t> </a:t>
+            </a:r>
+            <a:r>
+              <a:rPr lang="da-DK" sz="1800" dirty="0" err="1" smtClean="0"/>
+              <a:t>routed</a:t>
+            </a:r>
+            <a:r>
+              <a:rPr lang="da-DK" sz="1800" dirty="0" smtClean="0"/>
+              <a:t> to </a:t>
+            </a:r>
+            <a:r>
+              <a:rPr lang="da-DK" sz="1800" dirty="0" err="1" smtClean="0"/>
+              <a:t>running</a:t>
+            </a:r>
+            <a:r>
+              <a:rPr lang="da-DK" sz="1800" dirty="0" smtClean="0"/>
+              <a:t> </a:t>
+            </a:r>
+            <a:r>
+              <a:rPr lang="da-DK" sz="1800" dirty="0" err="1" smtClean="0"/>
+              <a:t>computing</a:t>
+            </a:r>
+            <a:r>
+              <a:rPr lang="da-DK" sz="1800" dirty="0" smtClean="0"/>
+              <a:t> </a:t>
+            </a:r>
+            <a:r>
+              <a:rPr lang="da-DK" sz="1800" dirty="0" err="1" smtClean="0"/>
+              <a:t>instances</a:t>
+            </a:r>
+            <a:r>
+              <a:rPr lang="da-DK" sz="1800" dirty="0" smtClean="0"/>
+              <a:t>.</a:t>
             </a:r>
           </a:p>
         </p:txBody>
@@ -1934,12 +2507,12 @@
   <p:clrMapOvr>
     <a:masterClrMapping/>
   </p:clrMapOvr>
-  <p:transition spd="med" advClick="1"/>
+  <p:transition xmlns:p14="http://schemas.microsoft.com/office/powerpoint/2010/main" spd="med"/>
 </p:sld>
 </file>
 
 <file path=ppt/slides/slide2.xml><?xml version="1.0" encoding="utf-8"?>
-<p:sld xmlns:a="http://schemas.openxmlformats.org/drawingml/2006/main" xmlns:r="http://schemas.openxmlformats.org/officeDocument/2006/relationships" xmlns:p="http://schemas.openxmlformats.org/presentationml/2006/main" show="0" showMasterSp="1" showMasterPhAnim="1">
+<p:sld xmlns:a="http://schemas.openxmlformats.org/drawingml/2006/main" xmlns:r="http://schemas.openxmlformats.org/officeDocument/2006/relationships" xmlns:p="http://schemas.openxmlformats.org/presentationml/2006/main" show="0">
   <p:cSld>
     <p:spTree>
       <p:nvGrpSpPr>
@@ -1985,6 +2558,7 @@
             <a:pPr lvl="0" defTabSz="457200">
               <a:defRPr sz="1800"/>
             </a:pPr>
+            <a:endParaRPr/>
           </a:p>
         </p:txBody>
       </p:sp>
@@ -2038,6 +2612,7 @@
                   </a:solidFill>
                 </a:defRPr>
               </a:pPr>
+              <a:endParaRPr/>
             </a:p>
           </p:txBody>
         </p:sp>
@@ -2161,6 +2736,7 @@
                 <a:sym typeface="Helvetica"/>
               </a:defRPr>
             </a:pPr>
+            <a:endParaRPr/>
           </a:p>
         </p:txBody>
       </p:sp>
@@ -2197,6 +2773,7 @@
                 <a:sym typeface="Helvetica"/>
               </a:defRPr>
             </a:pPr>
+            <a:endParaRPr/>
           </a:p>
         </p:txBody>
       </p:sp>
@@ -2230,7 +2807,9 @@
       <p:sp>
         <p:nvSpPr>
           <p:cNvPr id="44" name="Shape 44"/>
-          <p:cNvSpPr/>
+          <p:cNvSpPr>
+            <a:spLocks noGrp="1"/>
+          </p:cNvSpPr>
           <p:nvPr>
             <p:ph type="title" idx="4294967295"/>
           </p:nvPr>
@@ -2254,7 +2833,7 @@
         </p:spPr>
         <p:txBody>
           <a:bodyPr lIns="0" tIns="0" rIns="0" bIns="0">
-            <a:normAutofit fontScale="100000" lnSpcReduction="0"/>
+            <a:normAutofit/>
           </a:bodyPr>
           <a:lstStyle/>
           <a:p>
@@ -2262,14 +2841,14 @@
               <a:lnSpc>
                 <a:spcPts val="11000"/>
               </a:lnSpc>
-              <a:defRPr b="0" sz="1800">
+              <a:defRPr sz="1800" b="0">
                 <a:solidFill>
                   <a:srgbClr val="000000"/>
                 </a:solidFill>
               </a:defRPr>
             </a:pPr>
             <a:r>
-              <a:rPr b="1" sz="9000">
+              <a:rPr sz="9000" b="1">
                 <a:solidFill>
                   <a:srgbClr val="707173"/>
                 </a:solidFill>
@@ -2277,7 +2856,7 @@
               <a:t>Titel </a:t>
             </a:r>
             <a:r>
-              <a:rPr b="1" sz="9000">
+              <a:rPr sz="9000" b="1">
                 <a:solidFill>
                   <a:srgbClr val="BD2A33"/>
                 </a:solidFill>
@@ -2285,14 +2864,14 @@
               <a:t>Arial Bold 1. 90/110pt, </a:t>
             </a:r>
             <a:br>
-              <a:rPr b="1" sz="9000">
+              <a:rPr sz="9000" b="1">
                 <a:solidFill>
                   <a:srgbClr val="BD2A33"/>
                 </a:solidFill>
               </a:rPr>
             </a:br>
             <a:r>
-              <a:rPr b="1" sz="9000">
+              <a:rPr sz="9000" b="1">
                 <a:solidFill>
                   <a:srgbClr val="BD2A33"/>
                 </a:solidFill>
@@ -2305,7 +2884,9 @@
       <p:sp>
         <p:nvSpPr>
           <p:cNvPr id="45" name="Shape 45"/>
-          <p:cNvSpPr/>
+          <p:cNvSpPr>
+            <a:spLocks noGrp="1"/>
+          </p:cNvSpPr>
           <p:nvPr>
             <p:ph type="body" idx="4294967295"/>
           </p:nvPr>
@@ -2329,19 +2910,19 @@
         </p:spPr>
         <p:txBody>
           <a:bodyPr lIns="0" tIns="0" rIns="0" bIns="0">
-            <a:normAutofit fontScale="100000" lnSpcReduction="0"/>
+            <a:normAutofit/>
           </a:bodyPr>
           <a:lstStyle/>
           <a:p>
-            <a:pPr lvl="0" marL="0" indent="0">
-              <a:defRPr b="0" sz="1800">
+            <a:pPr marL="0" lvl="0" indent="0">
+              <a:defRPr sz="1800" b="0">
                 <a:solidFill>
                   <a:srgbClr val="000000"/>
                 </a:solidFill>
               </a:defRPr>
             </a:pPr>
             <a:r>
-              <a:rPr b="1" sz="4000">
+              <a:rPr sz="4000" b="1" dirty="0">
                 <a:solidFill>
                   <a:srgbClr val="707173"/>
                 </a:solidFill>
@@ -2349,82 +2930,82 @@
               <a:t>Manchet  </a:t>
             </a:r>
             <a:r>
-              <a:rPr b="1" sz="4000">
+              <a:rPr sz="4000" b="1" dirty="0">
                 <a:solidFill>
                   <a:srgbClr val="BD2A33"/>
                 </a:solidFill>
               </a:rPr>
               <a:t>(Arial Bold 1. 30/40pt. el. </a:t>
             </a:r>
-            <a:endParaRPr b="1" sz="3600">
+            <a:endParaRPr sz="3600" b="1" dirty="0">
               <a:solidFill>
                 <a:srgbClr val="BD2A33"/>
               </a:solidFill>
             </a:endParaRPr>
           </a:p>
           <a:p>
-            <a:pPr lvl="0" marL="0" indent="0">
-              <a:defRPr b="0" sz="1800">
+            <a:pPr marL="0" lvl="0" indent="0">
+              <a:defRPr sz="1800" b="0">
                 <a:solidFill>
                   <a:srgbClr val="000000"/>
                 </a:solidFill>
               </a:defRPr>
             </a:pPr>
             <a:r>
-              <a:rPr b="1" sz="4000">
+              <a:rPr sz="4000" b="1" dirty="0">
                 <a:solidFill>
                   <a:srgbClr val="BD2A33"/>
                 </a:solidFill>
               </a:rPr>
               <a:t>2. 40/50pt)</a:t>
             </a:r>
-            <a:endParaRPr b="1" sz="3600">
+            <a:endParaRPr sz="3600" b="1" dirty="0">
               <a:solidFill>
                 <a:srgbClr val="BD2A33"/>
               </a:solidFill>
             </a:endParaRPr>
           </a:p>
           <a:p>
-            <a:pPr lvl="0" marL="0" indent="0">
-              <a:defRPr b="0" sz="1800">
+            <a:pPr marL="0" lvl="0" indent="0">
+              <a:defRPr sz="1800" b="0">
                 <a:solidFill>
                   <a:srgbClr val="000000"/>
                 </a:solidFill>
               </a:defRPr>
             </a:pPr>
-            <a:endParaRPr b="1" sz="3600">
+            <a:endParaRPr sz="3600" b="1" dirty="0">
               <a:solidFill>
                 <a:srgbClr val="BD2A33"/>
               </a:solidFill>
             </a:endParaRPr>
           </a:p>
           <a:p>
-            <a:pPr lvl="0" marL="0" indent="0">
-              <a:defRPr b="0" sz="1800">
+            <a:pPr marL="0" lvl="0" indent="0">
+              <a:defRPr sz="1800" b="0">
                 <a:solidFill>
                   <a:srgbClr val="000000"/>
                 </a:solidFill>
               </a:defRPr>
             </a:pPr>
-            <a:endParaRPr b="1" sz="4900">
+            <a:endParaRPr sz="4900" b="1" dirty="0">
               <a:solidFill>
                 <a:srgbClr val="707173"/>
               </a:solidFill>
             </a:endParaRPr>
           </a:p>
           <a:p>
-            <a:pPr lvl="0" marL="0" indent="0">
+            <a:pPr marL="0" lvl="0" indent="0">
               <a:lnSpc>
                 <a:spcPts val="3000"/>
               </a:lnSpc>
-              <a:defRPr b="0" sz="1800">
+              <a:defRPr sz="1800" b="0">
                 <a:solidFill>
                   <a:srgbClr val="000000"/>
                 </a:solidFill>
               </a:defRPr>
             </a:pPr>
             <a:r>
-              <a:rPr b="1" sz="2200">
+              <a:rPr sz="2200" b="1" dirty="0">
                 <a:solidFill>
                   <a:srgbClr val="707173"/>
                 </a:solidFill>
@@ -2432,7 +3013,7 @@
               <a:t>Mellemrubrik </a:t>
             </a:r>
             <a:r>
-              <a:rPr b="1" sz="2200">
+              <a:rPr sz="2200" b="1" dirty="0">
                 <a:solidFill>
                   <a:srgbClr val="BD2A33"/>
                 </a:solidFill>
@@ -2440,36 +3021,31 @@
               <a:t>(Arial Bold 1. 18/24pt. el.  2. 22/30pt.)</a:t>
             </a:r>
             <a:r>
-              <a:rPr b="1" sz="2200">
+              <a:rPr sz="2200" b="1" dirty="0">
                 <a:solidFill>
                   <a:srgbClr val="707173"/>
                 </a:solidFill>
               </a:rPr>
               <a:t> </a:t>
             </a:r>
-            <a:endParaRPr b="1" sz="2200">
-              <a:solidFill>
-                <a:srgbClr val="707173"/>
-              </a:solidFill>
-            </a:endParaRPr>
-          </a:p>
-          <a:p>
-            <a:pPr lvl="0" marL="0" indent="0">
+          </a:p>
+          <a:p>
+            <a:pPr marL="0" lvl="0" indent="0">
               <a:lnSpc>
                 <a:spcPts val="3000"/>
               </a:lnSpc>
-              <a:defRPr b="0" sz="1800">
+              <a:defRPr sz="1800" b="0">
                 <a:solidFill>
                   <a:srgbClr val="000000"/>
                 </a:solidFill>
               </a:defRPr>
             </a:pPr>
             <a:r>
-              <a:rPr sz="2200"/>
+              <a:rPr sz="2200" dirty="0"/>
               <a:t>Brødtekst </a:t>
             </a:r>
             <a:r>
-              <a:rPr sz="2200">
+              <a:rPr sz="2200" dirty="0">
                 <a:solidFill>
                   <a:srgbClr val="BD2A33"/>
                 </a:solidFill>
@@ -2515,7 +3091,7 @@
               <a:defRPr sz="1800"/>
             </a:pPr>
             <a:r>
-              <a:rPr b="1" sz="2200">
+              <a:rPr sz="2200" b="1" dirty="0">
                 <a:solidFill>
                   <a:srgbClr val="707173"/>
                 </a:solidFill>
@@ -2523,7 +3099,7 @@
               <a:t>Mellemrubrik </a:t>
             </a:r>
             <a:r>
-              <a:rPr b="1" sz="2200">
+              <a:rPr sz="2200" b="1" dirty="0">
                 <a:solidFill>
                   <a:srgbClr val="BD2A33"/>
                 </a:solidFill>
@@ -2531,18 +3107,13 @@
               <a:t>(Arial Bold 1. 18/24pt. el.  2. 22/30pt.)</a:t>
             </a:r>
             <a:r>
-              <a:rPr b="1" sz="2200">
+              <a:rPr sz="2200" b="1" dirty="0">
                 <a:solidFill>
                   <a:srgbClr val="707173"/>
                 </a:solidFill>
               </a:rPr>
               <a:t> </a:t>
             </a:r>
-            <a:endParaRPr b="1" sz="2200">
-              <a:solidFill>
-                <a:srgbClr val="707173"/>
-              </a:solidFill>
-            </a:endParaRPr>
           </a:p>
           <a:p>
             <a:pPr lvl="0" defTabSz="622300">
@@ -2552,11 +3123,11 @@
               <a:defRPr sz="1800"/>
             </a:pPr>
             <a:r>
-              <a:rPr sz="2200"/>
+              <a:rPr sz="2200" dirty="0"/>
               <a:t>Brødtekst </a:t>
             </a:r>
             <a:r>
-              <a:rPr sz="2200">
+              <a:rPr sz="2200" dirty="0">
                 <a:solidFill>
                   <a:srgbClr val="BD2A33"/>
                 </a:solidFill>
@@ -2602,11 +3173,11 @@
               <a:defRPr sz="1800"/>
             </a:pPr>
             <a:r>
-              <a:rPr b="1" sz="5000"/>
+              <a:rPr sz="5000" b="1"/>
               <a:t>Forfatter: Navn, Titel </a:t>
             </a:r>
             <a:r>
-              <a:rPr b="1" sz="5000">
+              <a:rPr sz="5000" b="1">
                 <a:solidFill>
                   <a:srgbClr val="BD2A33"/>
                 </a:solidFill>
@@ -2702,7 +3273,7 @@
               <a:defRPr sz="1800"/>
             </a:pPr>
             <a:r>
-              <a:rPr b="1" sz="4000">
+              <a:rPr sz="4000" b="1" dirty="0">
                 <a:solidFill>
                   <a:srgbClr val="707173"/>
                 </a:solidFill>
@@ -2710,18 +3281,13 @@
               <a:t>Manchet  </a:t>
             </a:r>
             <a:r>
-              <a:rPr b="1" sz="4000">
+              <a:rPr sz="4000" b="1" dirty="0">
                 <a:solidFill>
                   <a:srgbClr val="BD2A33"/>
                 </a:solidFill>
               </a:rPr>
               <a:t>(Arial Bold 1. 30/40pt. el. </a:t>
             </a:r>
-            <a:endParaRPr b="1" sz="4000">
-              <a:solidFill>
-                <a:srgbClr val="BD2A33"/>
-              </a:solidFill>
-            </a:endParaRPr>
           </a:p>
           <a:p>
             <a:pPr lvl="0" defTabSz="622300">
@@ -2731,18 +3297,13 @@
               <a:defRPr sz="1800"/>
             </a:pPr>
             <a:r>
-              <a:rPr b="1" sz="4000">
+              <a:rPr sz="4000" b="1" dirty="0">
                 <a:solidFill>
                   <a:srgbClr val="BD2A33"/>
                 </a:solidFill>
               </a:rPr>
               <a:t>2. 40/50pt)</a:t>
             </a:r>
-            <a:endParaRPr b="1" sz="4000">
-              <a:solidFill>
-                <a:srgbClr val="BD2A33"/>
-              </a:solidFill>
-            </a:endParaRPr>
           </a:p>
         </p:txBody>
       </p:sp>
@@ -2782,7 +3343,7 @@
               <a:defRPr sz="1800"/>
             </a:pPr>
             <a:r>
-              <a:rPr b="1" sz="2200">
+              <a:rPr sz="2200" b="1">
                 <a:solidFill>
                   <a:srgbClr val="707173"/>
                 </a:solidFill>
@@ -2790,7 +3351,7 @@
               <a:t>Mellemrubrik </a:t>
             </a:r>
             <a:r>
-              <a:rPr b="1" sz="2200">
+              <a:rPr sz="2200" b="1">
                 <a:solidFill>
                   <a:srgbClr val="BD2A33"/>
                 </a:solidFill>
@@ -2798,18 +3359,13 @@
               <a:t>(Arial Bold 1. 18/24pt. el.  2. 22/30pt.)</a:t>
             </a:r>
             <a:r>
-              <a:rPr b="1" sz="2200">
+              <a:rPr sz="2200" b="1">
                 <a:solidFill>
                   <a:srgbClr val="707173"/>
                 </a:solidFill>
               </a:rPr>
               <a:t> </a:t>
             </a:r>
-            <a:endParaRPr b="1" sz="2200">
-              <a:solidFill>
-                <a:srgbClr val="707173"/>
-              </a:solidFill>
-            </a:endParaRPr>
           </a:p>
           <a:p>
             <a:pPr lvl="0" defTabSz="622300">
@@ -2830,7 +3386,7 @@
               </a:rPr>
               <a:t>(Arial 1. 18/24pt. el. 2. 22/30pt.)</a:t>
             </a:r>
-            <a:endParaRPr b="1" sz="2200">
+            <a:endParaRPr sz="2200" b="1">
               <a:solidFill>
                 <a:srgbClr val="707173"/>
               </a:solidFill>
@@ -2872,7 +3428,7 @@
           <p:nvPr/>
         </p:nvPicPr>
         <p:blipFill>
-          <a:blip r:embed="rId5">
+          <a:blip r:embed="rId4">
             <a:extLst/>
           </a:blip>
           <a:stretch>
@@ -2899,7 +3455,7 @@
           <p:nvPr/>
         </p:nvPicPr>
         <p:blipFill>
-          <a:blip r:embed="rId6">
+          <a:blip r:embed="rId4">
             <a:extLst/>
           </a:blip>
           <a:stretch>
@@ -2926,7 +3482,7 @@
           <p:nvPr/>
         </p:nvPicPr>
         <p:blipFill>
-          <a:blip r:embed="rId7">
+          <a:blip r:embed="rId4">
             <a:extLst/>
           </a:blip>
           <a:stretch>
@@ -2951,12 +3507,12 @@
   <p:clrMapOvr>
     <a:masterClrMapping/>
   </p:clrMapOvr>
-  <p:transition spd="med" advClick="1"/>
+  <p:transition xmlns:p14="http://schemas.microsoft.com/office/powerpoint/2010/main" spd="med"/>
 </p:sld>
 </file>
 
 <file path=ppt/slides/slide3.xml><?xml version="1.0" encoding="utf-8"?>
-<p:sld xmlns:a="http://schemas.openxmlformats.org/drawingml/2006/main" xmlns:r="http://schemas.openxmlformats.org/officeDocument/2006/relationships" xmlns:p="http://schemas.openxmlformats.org/presentationml/2006/main" show="0" showMasterSp="1" showMasterPhAnim="1">
+<p:sld xmlns:a="http://schemas.openxmlformats.org/drawingml/2006/main" xmlns:r="http://schemas.openxmlformats.org/officeDocument/2006/relationships" xmlns:p="http://schemas.openxmlformats.org/presentationml/2006/main" show="0">
   <p:cSld>
     <p:spTree>
       <p:nvGrpSpPr>
@@ -3030,6 +3586,7 @@
             <a:pPr lvl="0" defTabSz="457200">
               <a:defRPr sz="1800"/>
             </a:pPr>
+            <a:endParaRPr/>
           </a:p>
         </p:txBody>
       </p:sp>
@@ -3083,6 +3640,7 @@
                   </a:solidFill>
                 </a:defRPr>
               </a:pPr>
+              <a:endParaRPr/>
             </a:p>
           </p:txBody>
         </p:sp>
@@ -3178,6 +3736,7 @@
                 <a:sym typeface="Helvetica"/>
               </a:defRPr>
             </a:pPr>
+            <a:endParaRPr/>
           </a:p>
         </p:txBody>
       </p:sp>
@@ -3214,6 +3773,7 @@
                 <a:sym typeface="Helvetica"/>
               </a:defRPr>
             </a:pPr>
+            <a:endParaRPr/>
           </a:p>
         </p:txBody>
       </p:sp>
@@ -3247,7 +3807,9 @@
       <p:sp>
         <p:nvSpPr>
           <p:cNvPr id="64" name="Shape 64"/>
-          <p:cNvSpPr/>
+          <p:cNvSpPr>
+            <a:spLocks noGrp="1"/>
+          </p:cNvSpPr>
           <p:nvPr>
             <p:ph type="title" idx="4294967295"/>
           </p:nvPr>
@@ -3271,7 +3833,7 @@
         </p:spPr>
         <p:txBody>
           <a:bodyPr lIns="0" tIns="0" rIns="0" bIns="0">
-            <a:normAutofit fontScale="100000" lnSpcReduction="0"/>
+            <a:normAutofit/>
           </a:bodyPr>
           <a:lstStyle/>
           <a:p>
@@ -3279,14 +3841,14 @@
               <a:lnSpc>
                 <a:spcPts val="11000"/>
               </a:lnSpc>
-              <a:defRPr b="0" sz="1800">
+              <a:defRPr sz="1800" b="0">
                 <a:solidFill>
                   <a:srgbClr val="000000"/>
                 </a:solidFill>
               </a:defRPr>
             </a:pPr>
             <a:r>
-              <a:rPr b="1" sz="9000">
+              <a:rPr sz="9000" b="1">
                 <a:solidFill>
                   <a:srgbClr val="707173"/>
                 </a:solidFill>
@@ -3294,7 +3856,7 @@
               <a:t>Titel </a:t>
             </a:r>
             <a:r>
-              <a:rPr b="1" sz="9000">
+              <a:rPr sz="9000" b="1">
                 <a:solidFill>
                   <a:srgbClr val="BD2A33"/>
                 </a:solidFill>
@@ -3302,14 +3864,14 @@
               <a:t>Arial Bold 1. 90/110pt, </a:t>
             </a:r>
             <a:br>
-              <a:rPr b="1" sz="9000">
+              <a:rPr sz="9000" b="1">
                 <a:solidFill>
                   <a:srgbClr val="BD2A33"/>
                 </a:solidFill>
               </a:rPr>
             </a:br>
             <a:r>
-              <a:rPr b="1" sz="9000">
+              <a:rPr sz="9000" b="1">
                 <a:solidFill>
                   <a:srgbClr val="BD2A33"/>
                 </a:solidFill>
@@ -3322,7 +3884,9 @@
       <p:sp>
         <p:nvSpPr>
           <p:cNvPr id="65" name="Shape 65"/>
-          <p:cNvSpPr/>
+          <p:cNvSpPr>
+            <a:spLocks noGrp="1"/>
+          </p:cNvSpPr>
           <p:nvPr>
             <p:ph type="body" idx="4294967295"/>
           </p:nvPr>
@@ -3346,19 +3910,19 @@
         </p:spPr>
         <p:txBody>
           <a:bodyPr lIns="0" tIns="0" rIns="0" bIns="0">
-            <a:normAutofit fontScale="100000" lnSpcReduction="0"/>
+            <a:normAutofit/>
           </a:bodyPr>
           <a:lstStyle/>
           <a:p>
-            <a:pPr lvl="0" marL="0" indent="0">
-              <a:defRPr b="0" sz="1800">
+            <a:pPr marL="0" lvl="0" indent="0">
+              <a:defRPr sz="1800" b="0">
                 <a:solidFill>
                   <a:srgbClr val="000000"/>
                 </a:solidFill>
               </a:defRPr>
             </a:pPr>
             <a:r>
-              <a:rPr b="1" sz="4000">
+              <a:rPr sz="4000" b="1">
                 <a:solidFill>
                   <a:srgbClr val="707173"/>
                 </a:solidFill>
@@ -3366,82 +3930,82 @@
               <a:t>Manchet  </a:t>
             </a:r>
             <a:r>
-              <a:rPr b="1" sz="4000">
+              <a:rPr sz="4000" b="1">
                 <a:solidFill>
                   <a:srgbClr val="BD2A33"/>
                 </a:solidFill>
               </a:rPr>
               <a:t>(Arial Bold 1. 30/40pt. el. </a:t>
             </a:r>
-            <a:endParaRPr b="1" sz="3600">
+            <a:endParaRPr sz="3600" b="1">
               <a:solidFill>
                 <a:srgbClr val="BD2A33"/>
               </a:solidFill>
             </a:endParaRPr>
           </a:p>
           <a:p>
-            <a:pPr lvl="0" marL="0" indent="0">
-              <a:defRPr b="0" sz="1800">
+            <a:pPr marL="0" lvl="0" indent="0">
+              <a:defRPr sz="1800" b="0">
                 <a:solidFill>
                   <a:srgbClr val="000000"/>
                 </a:solidFill>
               </a:defRPr>
             </a:pPr>
             <a:r>
-              <a:rPr b="1" sz="4000">
+              <a:rPr sz="4000" b="1">
                 <a:solidFill>
                   <a:srgbClr val="BD2A33"/>
                 </a:solidFill>
               </a:rPr>
               <a:t>2. 40/50pt)</a:t>
             </a:r>
-            <a:endParaRPr b="1" sz="3600">
+            <a:endParaRPr sz="3600" b="1">
               <a:solidFill>
                 <a:srgbClr val="BD2A33"/>
               </a:solidFill>
             </a:endParaRPr>
           </a:p>
           <a:p>
-            <a:pPr lvl="0" marL="0" indent="0">
-              <a:defRPr b="0" sz="1800">
+            <a:pPr marL="0" lvl="0" indent="0">
+              <a:defRPr sz="1800" b="0">
                 <a:solidFill>
                   <a:srgbClr val="000000"/>
                 </a:solidFill>
               </a:defRPr>
             </a:pPr>
-            <a:endParaRPr b="1" sz="3600">
+            <a:endParaRPr sz="3600" b="1">
               <a:solidFill>
                 <a:srgbClr val="BD2A33"/>
               </a:solidFill>
             </a:endParaRPr>
           </a:p>
           <a:p>
-            <a:pPr lvl="0" marL="0" indent="0">
-              <a:defRPr b="0" sz="1800">
+            <a:pPr marL="0" lvl="0" indent="0">
+              <a:defRPr sz="1800" b="0">
                 <a:solidFill>
                   <a:srgbClr val="000000"/>
                 </a:solidFill>
               </a:defRPr>
             </a:pPr>
-            <a:endParaRPr b="1" sz="4900">
+            <a:endParaRPr sz="4900" b="1">
               <a:solidFill>
                 <a:srgbClr val="707173"/>
               </a:solidFill>
             </a:endParaRPr>
           </a:p>
           <a:p>
-            <a:pPr lvl="0" marL="0" indent="0">
+            <a:pPr marL="0" lvl="0" indent="0">
               <a:lnSpc>
                 <a:spcPts val="3000"/>
               </a:lnSpc>
-              <a:defRPr b="0" sz="1800">
+              <a:defRPr sz="1800" b="0">
                 <a:solidFill>
                   <a:srgbClr val="000000"/>
                 </a:solidFill>
               </a:defRPr>
             </a:pPr>
             <a:r>
-              <a:rPr b="1" sz="2200">
+              <a:rPr sz="2200" b="1">
                 <a:solidFill>
                   <a:srgbClr val="707173"/>
                 </a:solidFill>
@@ -3449,7 +4013,7 @@
               <a:t>Mellemrubrik </a:t>
             </a:r>
             <a:r>
-              <a:rPr b="1" sz="2200">
+              <a:rPr sz="2200" b="1">
                 <a:solidFill>
                   <a:srgbClr val="BD2A33"/>
                 </a:solidFill>
@@ -3457,25 +4021,20 @@
               <a:t>(Arial Bold 1. 18/24pt. el.  2. 22/30pt.)</a:t>
             </a:r>
             <a:r>
-              <a:rPr b="1" sz="2200">
+              <a:rPr sz="2200" b="1">
                 <a:solidFill>
                   <a:srgbClr val="707173"/>
                 </a:solidFill>
               </a:rPr>
               <a:t> </a:t>
             </a:r>
-            <a:endParaRPr b="1" sz="2200">
-              <a:solidFill>
-                <a:srgbClr val="707173"/>
-              </a:solidFill>
-            </a:endParaRPr>
-          </a:p>
-          <a:p>
-            <a:pPr lvl="0" marL="0" indent="0">
+          </a:p>
+          <a:p>
+            <a:pPr marL="0" lvl="0" indent="0">
               <a:lnSpc>
                 <a:spcPts val="3000"/>
               </a:lnSpc>
-              <a:defRPr b="0" sz="1800">
+              <a:defRPr sz="1800" b="0">
                 <a:solidFill>
                   <a:srgbClr val="000000"/>
                 </a:solidFill>
@@ -3532,11 +4091,11 @@
               <a:defRPr sz="1800"/>
             </a:pPr>
             <a:r>
-              <a:rPr b="1" sz="5000"/>
+              <a:rPr sz="5000" b="1"/>
               <a:t>Forfatter: Navn, Titel </a:t>
             </a:r>
             <a:r>
-              <a:rPr b="1" sz="5000">
+              <a:rPr sz="5000" b="1">
                 <a:solidFill>
                   <a:srgbClr val="BD2A33"/>
                 </a:solidFill>
@@ -3632,7 +4191,7 @@
               <a:defRPr sz="1800"/>
             </a:pPr>
             <a:r>
-              <a:rPr b="1" sz="4000">
+              <a:rPr sz="4000" b="1">
                 <a:solidFill>
                   <a:srgbClr val="707173"/>
                 </a:solidFill>
@@ -3640,18 +4199,13 @@
               <a:t>Manchet  </a:t>
             </a:r>
             <a:r>
-              <a:rPr b="1" sz="4000">
+              <a:rPr sz="4000" b="1">
                 <a:solidFill>
                   <a:srgbClr val="BD2A33"/>
                 </a:solidFill>
               </a:rPr>
               <a:t>(Arial Bold 1. 30/40pt. el. </a:t>
             </a:r>
-            <a:endParaRPr b="1" sz="4000">
-              <a:solidFill>
-                <a:srgbClr val="BD2A33"/>
-              </a:solidFill>
-            </a:endParaRPr>
           </a:p>
           <a:p>
             <a:pPr lvl="0" defTabSz="622300">
@@ -3661,18 +4215,13 @@
               <a:defRPr sz="1800"/>
             </a:pPr>
             <a:r>
-              <a:rPr b="1" sz="4000">
+              <a:rPr sz="4000" b="1">
                 <a:solidFill>
                   <a:srgbClr val="BD2A33"/>
                 </a:solidFill>
               </a:rPr>
               <a:t>2. 40/50pt)</a:t>
             </a:r>
-            <a:endParaRPr b="1" sz="4000">
-              <a:solidFill>
-                <a:srgbClr val="BD2A33"/>
-              </a:solidFill>
-            </a:endParaRPr>
           </a:p>
         </p:txBody>
       </p:sp>
@@ -3712,7 +4261,7 @@
               <a:defRPr sz="1800"/>
             </a:pPr>
             <a:r>
-              <a:rPr b="1" sz="2200">
+              <a:rPr sz="2200" b="1">
                 <a:solidFill>
                   <a:srgbClr val="707173"/>
                 </a:solidFill>
@@ -3720,7 +4269,7 @@
               <a:t>Mellemrubrik </a:t>
             </a:r>
             <a:r>
-              <a:rPr b="1" sz="2200">
+              <a:rPr sz="2200" b="1">
                 <a:solidFill>
                   <a:srgbClr val="BD2A33"/>
                 </a:solidFill>
@@ -3728,18 +4277,13 @@
               <a:t>(Arial Bold 1. 18/24pt. el.  2. 22/30pt.)</a:t>
             </a:r>
             <a:r>
-              <a:rPr b="1" sz="2200">
+              <a:rPr sz="2200" b="1">
                 <a:solidFill>
                   <a:srgbClr val="707173"/>
                 </a:solidFill>
               </a:rPr>
               <a:t> </a:t>
             </a:r>
-            <a:endParaRPr b="1" sz="2200">
-              <a:solidFill>
-                <a:srgbClr val="707173"/>
-              </a:solidFill>
-            </a:endParaRPr>
           </a:p>
           <a:p>
             <a:pPr lvl="0" defTabSz="622300">
@@ -3760,7 +4304,7 @@
               </a:rPr>
               <a:t>(Arial 1. 18/24pt. el. 2. 22/30pt.)</a:t>
             </a:r>
-            <a:endParaRPr b="1" sz="2200">
+            <a:endParaRPr sz="2200" b="1">
               <a:solidFill>
                 <a:srgbClr val="707173"/>
               </a:solidFill>
@@ -3818,6 +4362,7 @@
                   </a:solidFill>
                 </a:defRPr>
               </a:pPr>
+              <a:endParaRPr/>
             </a:p>
           </p:txBody>
         </p:sp>
@@ -3980,6 +4525,7 @@
                   </a:solidFill>
                 </a:defRPr>
               </a:pPr>
+              <a:endParaRPr/>
             </a:p>
           </p:txBody>
         </p:sp>
@@ -4126,7 +4672,7 @@
           <p:nvPr/>
         </p:nvPicPr>
         <p:blipFill>
-          <a:blip r:embed="rId5">
+          <a:blip r:embed="rId4">
             <a:extLst/>
           </a:blip>
           <a:stretch>
@@ -4153,7 +4699,7 @@
           <p:nvPr/>
         </p:nvPicPr>
         <p:blipFill>
-          <a:blip r:embed="rId6">
+          <a:blip r:embed="rId4">
             <a:extLst/>
           </a:blip>
           <a:stretch>
@@ -4180,7 +4726,7 @@
           <p:nvPr/>
         </p:nvPicPr>
         <p:blipFill>
-          <a:blip r:embed="rId7">
+          <a:blip r:embed="rId4">
             <a:extLst/>
           </a:blip>
           <a:stretch>
@@ -4205,12 +4751,12 @@
   <p:clrMapOvr>
     <a:masterClrMapping/>
   </p:clrMapOvr>
-  <p:transition spd="med" advClick="1"/>
+  <p:transition xmlns:p14="http://schemas.microsoft.com/office/powerpoint/2010/main" spd="med"/>
 </p:sld>
 </file>
 
 <file path=ppt/slides/slide4.xml><?xml version="1.0" encoding="utf-8"?>
-<p:sld xmlns:a="http://schemas.openxmlformats.org/drawingml/2006/main" xmlns:r="http://schemas.openxmlformats.org/officeDocument/2006/relationships" xmlns:p="http://schemas.openxmlformats.org/presentationml/2006/main" show="0" showMasterSp="1" showMasterPhAnim="1">
+<p:sld xmlns:a="http://schemas.openxmlformats.org/drawingml/2006/main" xmlns:r="http://schemas.openxmlformats.org/officeDocument/2006/relationships" xmlns:p="http://schemas.openxmlformats.org/presentationml/2006/main" show="0">
   <p:cSld>
     <p:spTree>
       <p:nvGrpSpPr>
@@ -4256,6 +4802,7 @@
             <a:pPr lvl="0" defTabSz="457200">
               <a:defRPr sz="1800"/>
             </a:pPr>
+            <a:endParaRPr/>
           </a:p>
         </p:txBody>
       </p:sp>
@@ -4295,7 +4842,7 @@
               <a:defRPr sz="1800"/>
             </a:pPr>
             <a:r>
-              <a:rPr b="1" sz="4000">
+              <a:rPr sz="4000" b="1">
                 <a:solidFill>
                   <a:srgbClr val="707173"/>
                 </a:solidFill>
@@ -4303,7 +4850,7 @@
               <a:t>Manchet  </a:t>
             </a:r>
             <a:r>
-              <a:rPr b="1" sz="4000">
+              <a:rPr sz="4000" b="1">
                 <a:solidFill>
                   <a:srgbClr val="BD2A33"/>
                 </a:solidFill>
@@ -4363,6 +4910,7 @@
                   </a:solidFill>
                 </a:defRPr>
               </a:pPr>
+              <a:endParaRPr/>
             </a:p>
           </p:txBody>
         </p:sp>
@@ -4489,7 +5037,7 @@
               <a:defRPr sz="1800"/>
             </a:pPr>
             <a:r>
-              <a:rPr b="1" sz="4000">
+              <a:rPr sz="4000" b="1">
                 <a:solidFill>
                   <a:srgbClr val="707173"/>
                 </a:solidFill>
@@ -4497,7 +5045,7 @@
               <a:t>Manchet  </a:t>
             </a:r>
             <a:r>
-              <a:rPr b="1" sz="4000">
+              <a:rPr sz="4000" b="1">
                 <a:solidFill>
                   <a:srgbClr val="BD2A33"/>
                 </a:solidFill>
@@ -4543,11 +5091,11 @@
               <a:defRPr sz="1800"/>
             </a:pPr>
             <a:r>
-              <a:rPr b="1" sz="5000"/>
+              <a:rPr sz="5000" b="1"/>
               <a:t>Forfatter: Navn, Titel </a:t>
             </a:r>
             <a:r>
-              <a:rPr b="1" sz="5000">
+              <a:rPr sz="5000" b="1">
                 <a:solidFill>
                   <a:srgbClr val="BD2A33"/>
                 </a:solidFill>
@@ -4560,7 +5108,9 @@
       <p:sp>
         <p:nvSpPr>
           <p:cNvPr id="91" name="Shape 91"/>
-          <p:cNvSpPr/>
+          <p:cNvSpPr>
+            <a:spLocks noGrp="1"/>
+          </p:cNvSpPr>
           <p:nvPr>
             <p:ph type="title" idx="4294967295"/>
           </p:nvPr>
@@ -4584,19 +5134,19 @@
         </p:spPr>
         <p:txBody>
           <a:bodyPr lIns="0" tIns="0" rIns="0" bIns="0">
-            <a:normAutofit fontScale="100000" lnSpcReduction="0"/>
+            <a:normAutofit/>
           </a:bodyPr>
           <a:lstStyle/>
           <a:p>
             <a:pPr lvl="0">
-              <a:defRPr b="0" sz="1800">
+              <a:defRPr sz="1800" b="0">
                 <a:solidFill>
                   <a:srgbClr val="000000"/>
                 </a:solidFill>
               </a:defRPr>
             </a:pPr>
             <a:r>
-              <a:rPr b="1" sz="9000">
+              <a:rPr sz="9000" b="1">
                 <a:solidFill>
                   <a:srgbClr val="707173"/>
                 </a:solidFill>
@@ -4604,7 +5154,7 @@
               <a:t>Titel </a:t>
             </a:r>
             <a:r>
-              <a:rPr b="1" sz="9000">
+              <a:rPr sz="9000" b="1">
                 <a:solidFill>
                   <a:srgbClr val="BD2A33"/>
                 </a:solidFill>
@@ -4612,14 +5162,14 @@
               <a:t>Arial Bold 1. 90/110pt, </a:t>
             </a:r>
             <a:br>
-              <a:rPr b="1" sz="9000">
+              <a:rPr sz="9000" b="1">
                 <a:solidFill>
                   <a:srgbClr val="BD2A33"/>
                 </a:solidFill>
               </a:rPr>
             </a:br>
             <a:r>
-              <a:rPr b="1" sz="9000">
+              <a:rPr sz="9000" b="1">
                 <a:solidFill>
                   <a:srgbClr val="BD2A33"/>
                 </a:solidFill>
@@ -4689,6 +5239,7 @@
                 <a:sym typeface="Helvetica"/>
               </a:defRPr>
             </a:pPr>
+            <a:endParaRPr/>
           </a:p>
         </p:txBody>
       </p:sp>
@@ -4725,6 +5276,7 @@
                 <a:sym typeface="Helvetica"/>
               </a:defRPr>
             </a:pPr>
+            <a:endParaRPr/>
           </a:p>
         </p:txBody>
       </p:sp>
@@ -4781,11 +5333,6 @@
               </a:rPr>
               <a:t>(Arial Regular 14/18pt.)</a:t>
             </a:r>
-            <a:endParaRPr>
-              <a:solidFill>
-                <a:srgbClr val="BD2A33"/>
-              </a:solidFill>
-            </a:endParaRPr>
           </a:p>
         </p:txBody>
       </p:sp>
@@ -4871,12 +5418,12 @@
   <p:clrMapOvr>
     <a:masterClrMapping/>
   </p:clrMapOvr>
-  <p:transition spd="med" advClick="1"/>
+  <p:transition xmlns:p14="http://schemas.microsoft.com/office/powerpoint/2010/main" spd="med"/>
 </p:sld>
 </file>
 
 <file path=ppt/theme/theme1.xml><?xml version="1.0" encoding="utf-8"?>
-<a:theme xmlns:a="http://schemas.openxmlformats.org/drawingml/2006/main" xmlns:r="http://schemas.openxmlformats.org/officeDocument/2006/relationships" name="Default">
+<a:theme xmlns:a="http://schemas.openxmlformats.org/drawingml/2006/main" name="Default">
   <a:themeElements>
     <a:clrScheme name="Default">
       <a:dk1>
@@ -5008,7 +5555,7 @@
         </a:effectStyle>
         <a:effectStyle>
           <a:effectLst>
-            <a:outerShdw sx="100000" sy="100000" kx="0" ky="0" algn="b" rotWithShape="0" blurRad="38100" dist="20000" dir="5400000">
+            <a:outerShdw blurRad="38100" dist="20000" dir="5400000" rotWithShape="0">
               <a:srgbClr val="000000">
                 <a:alpha val="38000"/>
               </a:srgbClr>
@@ -5083,7 +5630,7 @@
         </a:ln>
         <a:effectLst/>
       </a:spPr>
-      <a:bodyPr rot="0" spcFirstLastPara="1" vertOverflow="overflow" horzOverflow="overflow" vert="horz" wrap="square" lIns="45719" tIns="45719" rIns="45719" bIns="45719" numCol="1" spcCol="38100" rtlCol="0" anchor="t" upright="0">
+      <a:bodyPr rot="0" spcFirstLastPara="1" vertOverflow="overflow" horzOverflow="overflow" vert="horz" wrap="square" lIns="45719" tIns="45719" rIns="45719" bIns="45719" numCol="1" spcCol="38100" rtlCol="0" anchor="t">
         <a:spAutoFit/>
       </a:bodyPr>
       <a:lstStyle>
@@ -5102,7 +5649,7 @@
           <a:buFontTx/>
           <a:buNone/>
           <a:tabLst/>
-          <a:defRPr b="0" baseline="0" cap="none" i="0" spc="0" strike="noStrike" sz="1200" u="none" kumimoji="0" normalizeH="0">
+          <a:defRPr kumimoji="0" sz="1200" b="0" i="0" u="none" strike="noStrike" cap="none" spc="0" normalizeH="0" baseline="0">
             <a:ln>
               <a:noFill/>
             </a:ln>
@@ -5132,7 +5679,7 @@
           <a:buFontTx/>
           <a:buNone/>
           <a:tabLst/>
-          <a:defRPr b="0" baseline="0" cap="none" i="0" spc="0" strike="noStrike" sz="1800" u="none" kumimoji="0" normalizeH="0">
+          <a:defRPr kumimoji="0" sz="1800" b="0" i="0" u="none" strike="noStrike" cap="none" spc="0" normalizeH="0" baseline="0">
             <a:ln>
               <a:noFill/>
             </a:ln>
@@ -5158,7 +5705,7 @@
           <a:buFontTx/>
           <a:buNone/>
           <a:tabLst/>
-          <a:defRPr b="0" baseline="0" cap="none" i="0" spc="0" strike="noStrike" sz="1800" u="none" kumimoji="0" normalizeH="0">
+          <a:defRPr kumimoji="0" sz="1800" b="0" i="0" u="none" strike="noStrike" cap="none" spc="0" normalizeH="0" baseline="0">
             <a:ln>
               <a:noFill/>
             </a:ln>
@@ -5184,7 +5731,7 @@
           <a:buFontTx/>
           <a:buNone/>
           <a:tabLst/>
-          <a:defRPr b="0" baseline="0" cap="none" i="0" spc="0" strike="noStrike" sz="1800" u="none" kumimoji="0" normalizeH="0">
+          <a:defRPr kumimoji="0" sz="1800" b="0" i="0" u="none" strike="noStrike" cap="none" spc="0" normalizeH="0" baseline="0">
             <a:ln>
               <a:noFill/>
             </a:ln>
@@ -5210,7 +5757,7 @@
           <a:buFontTx/>
           <a:buNone/>
           <a:tabLst/>
-          <a:defRPr b="0" baseline="0" cap="none" i="0" spc="0" strike="noStrike" sz="1800" u="none" kumimoji="0" normalizeH="0">
+          <a:defRPr kumimoji="0" sz="1800" b="0" i="0" u="none" strike="noStrike" cap="none" spc="0" normalizeH="0" baseline="0">
             <a:ln>
               <a:noFill/>
             </a:ln>
@@ -5236,7 +5783,7 @@
           <a:buFontTx/>
           <a:buNone/>
           <a:tabLst/>
-          <a:defRPr b="0" baseline="0" cap="none" i="0" spc="0" strike="noStrike" sz="1800" u="none" kumimoji="0" normalizeH="0">
+          <a:defRPr kumimoji="0" sz="1800" b="0" i="0" u="none" strike="noStrike" cap="none" spc="0" normalizeH="0" baseline="0">
             <a:ln>
               <a:noFill/>
             </a:ln>
@@ -5262,7 +5809,7 @@
           <a:buFontTx/>
           <a:buNone/>
           <a:tabLst/>
-          <a:defRPr b="0" baseline="0" cap="none" i="0" spc="0" strike="noStrike" sz="1800" u="none" kumimoji="0" normalizeH="0">
+          <a:defRPr kumimoji="0" sz="1800" b="0" i="0" u="none" strike="noStrike" cap="none" spc="0" normalizeH="0" baseline="0">
             <a:ln>
               <a:noFill/>
             </a:ln>
@@ -5288,7 +5835,7 @@
           <a:buFontTx/>
           <a:buNone/>
           <a:tabLst/>
-          <a:defRPr b="0" baseline="0" cap="none" i="0" spc="0" strike="noStrike" sz="1800" u="none" kumimoji="0" normalizeH="0">
+          <a:defRPr kumimoji="0" sz="1800" b="0" i="0" u="none" strike="noStrike" cap="none" spc="0" normalizeH="0" baseline="0">
             <a:ln>
               <a:noFill/>
             </a:ln>
@@ -5314,7 +5861,7 @@
           <a:buFontTx/>
           <a:buNone/>
           <a:tabLst/>
-          <a:defRPr b="0" baseline="0" cap="none" i="0" spc="0" strike="noStrike" sz="1800" u="none" kumimoji="0" normalizeH="0">
+          <a:defRPr kumimoji="0" sz="1800" b="0" i="0" u="none" strike="noStrike" cap="none" spc="0" normalizeH="0" baseline="0">
             <a:ln>
               <a:noFill/>
             </a:ln>
@@ -5340,7 +5887,7 @@
           <a:buFontTx/>
           <a:buNone/>
           <a:tabLst/>
-          <a:defRPr b="0" baseline="0" cap="none" i="0" spc="0" strike="noStrike" sz="1800" u="none" kumimoji="0" normalizeH="0">
+          <a:defRPr kumimoji="0" sz="1800" b="0" i="0" u="none" strike="noStrike" cap="none" spc="0" normalizeH="0" baseline="0">
             <a:ln>
               <a:noFill/>
             </a:ln>
@@ -5353,9 +5900,15 @@
         </a:lvl9pPr>
       </a:lstStyle>
       <a:style>
-        <a:lnRef idx="0"/>
-        <a:fillRef idx="0"/>
-        <a:effectRef idx="0"/>
+        <a:lnRef idx="0">
+          <a:scrgbClr r="0" g="0" b="0"/>
+        </a:lnRef>
+        <a:fillRef idx="0">
+          <a:scrgbClr r="0" g="0" b="0"/>
+        </a:fillRef>
+        <a:effectRef idx="0">
+          <a:scrgbClr r="0" g="0" b="0"/>
+        </a:effectRef>
         <a:fontRef idx="none"/>
       </a:style>
     </a:spDef>
@@ -5370,14 +5923,14 @@
           <a:bevel/>
         </a:ln>
         <a:effectLst>
-          <a:outerShdw sx="100000" sy="100000" kx="0" ky="0" algn="b" rotWithShape="0" blurRad="38100" dist="20000" dir="5400000">
+          <a:outerShdw blurRad="38100" dist="20000" dir="5400000" rotWithShape="0">
             <a:srgbClr val="000000">
               <a:alpha val="38000"/>
             </a:srgbClr>
           </a:outerShdw>
         </a:effectLst>
       </a:spPr>
-      <a:bodyPr rot="0" spcFirstLastPara="1" vertOverflow="overflow" horzOverflow="overflow" vert="horz" wrap="square" lIns="91439" tIns="45719" rIns="91439" bIns="45719" numCol="1" spcCol="38100" rtlCol="0" anchor="t" upright="0">
+      <a:bodyPr rot="0" spcFirstLastPara="1" vertOverflow="overflow" horzOverflow="overflow" vert="horz" wrap="square" lIns="91439" tIns="45719" rIns="91439" bIns="45719" numCol="1" spcCol="38100" rtlCol="0" anchor="t">
         <a:noAutofit/>
       </a:bodyPr>
       <a:lstStyle>
@@ -5396,7 +5949,7 @@
           <a:buFontTx/>
           <a:buNone/>
           <a:tabLst/>
-          <a:defRPr b="0" baseline="0" cap="none" i="0" spc="0" strike="noStrike" sz="1800" u="none" kumimoji="0" normalizeH="0">
+          <a:defRPr kumimoji="0" sz="1800" b="0" i="0" u="none" strike="noStrike" cap="none" spc="0" normalizeH="0" baseline="0">
             <a:ln>
               <a:noFill/>
             </a:ln>
@@ -5422,7 +5975,7 @@
           <a:buFontTx/>
           <a:buNone/>
           <a:tabLst/>
-          <a:defRPr b="0" baseline="0" cap="none" i="0" spc="0" strike="noStrike" sz="1800" u="none" kumimoji="0" normalizeH="0">
+          <a:defRPr kumimoji="0" sz="1800" b="0" i="0" u="none" strike="noStrike" cap="none" spc="0" normalizeH="0" baseline="0">
             <a:ln>
               <a:noFill/>
             </a:ln>
@@ -5448,7 +6001,7 @@
           <a:buFontTx/>
           <a:buNone/>
           <a:tabLst/>
-          <a:defRPr b="0" baseline="0" cap="none" i="0" spc="0" strike="noStrike" sz="1800" u="none" kumimoji="0" normalizeH="0">
+          <a:defRPr kumimoji="0" sz="1800" b="0" i="0" u="none" strike="noStrike" cap="none" spc="0" normalizeH="0" baseline="0">
             <a:ln>
               <a:noFill/>
             </a:ln>
@@ -5474,7 +6027,7 @@
           <a:buFontTx/>
           <a:buNone/>
           <a:tabLst/>
-          <a:defRPr b="0" baseline="0" cap="none" i="0" spc="0" strike="noStrike" sz="1800" u="none" kumimoji="0" normalizeH="0">
+          <a:defRPr kumimoji="0" sz="1800" b="0" i="0" u="none" strike="noStrike" cap="none" spc="0" normalizeH="0" baseline="0">
             <a:ln>
               <a:noFill/>
             </a:ln>
@@ -5500,7 +6053,7 @@
           <a:buFontTx/>
           <a:buNone/>
           <a:tabLst/>
-          <a:defRPr b="0" baseline="0" cap="none" i="0" spc="0" strike="noStrike" sz="1800" u="none" kumimoji="0" normalizeH="0">
+          <a:defRPr kumimoji="0" sz="1800" b="0" i="0" u="none" strike="noStrike" cap="none" spc="0" normalizeH="0" baseline="0">
             <a:ln>
               <a:noFill/>
             </a:ln>
@@ -5526,7 +6079,7 @@
           <a:buFontTx/>
           <a:buNone/>
           <a:tabLst/>
-          <a:defRPr b="0" baseline="0" cap="none" i="0" spc="0" strike="noStrike" sz="1800" u="none" kumimoji="0" normalizeH="0">
+          <a:defRPr kumimoji="0" sz="1800" b="0" i="0" u="none" strike="noStrike" cap="none" spc="0" normalizeH="0" baseline="0">
             <a:ln>
               <a:noFill/>
             </a:ln>
@@ -5552,7 +6105,7 @@
           <a:buFontTx/>
           <a:buNone/>
           <a:tabLst/>
-          <a:defRPr b="0" baseline="0" cap="none" i="0" spc="0" strike="noStrike" sz="1800" u="none" kumimoji="0" normalizeH="0">
+          <a:defRPr kumimoji="0" sz="1800" b="0" i="0" u="none" strike="noStrike" cap="none" spc="0" normalizeH="0" baseline="0">
             <a:ln>
               <a:noFill/>
             </a:ln>
@@ -5578,7 +6131,7 @@
           <a:buFontTx/>
           <a:buNone/>
           <a:tabLst/>
-          <a:defRPr b="0" baseline="0" cap="none" i="0" spc="0" strike="noStrike" sz="1800" u="none" kumimoji="0" normalizeH="0">
+          <a:defRPr kumimoji="0" sz="1800" b="0" i="0" u="none" strike="noStrike" cap="none" spc="0" normalizeH="0" baseline="0">
             <a:ln>
               <a:noFill/>
             </a:ln>
@@ -5604,7 +6157,7 @@
           <a:buFontTx/>
           <a:buNone/>
           <a:tabLst/>
-          <a:defRPr b="0" baseline="0" cap="none" i="0" spc="0" strike="noStrike" sz="1800" u="none" kumimoji="0" normalizeH="0">
+          <a:defRPr kumimoji="0" sz="1800" b="0" i="0" u="none" strike="noStrike" cap="none" spc="0" normalizeH="0" baseline="0">
             <a:ln>
               <a:noFill/>
             </a:ln>
@@ -5630,7 +6183,7 @@
           <a:buFontTx/>
           <a:buNone/>
           <a:tabLst/>
-          <a:defRPr b="0" baseline="0" cap="none" i="0" spc="0" strike="noStrike" sz="1800" u="none" kumimoji="0" normalizeH="0">
+          <a:defRPr kumimoji="0" sz="1800" b="0" i="0" u="none" strike="noStrike" cap="none" spc="0" normalizeH="0" baseline="0">
             <a:ln>
               <a:noFill/>
             </a:ln>
@@ -5643,9 +6196,15 @@
         </a:lvl9pPr>
       </a:lstStyle>
       <a:style>
-        <a:lnRef idx="0"/>
-        <a:fillRef idx="0"/>
-        <a:effectRef idx="0"/>
+        <a:lnRef idx="0">
+          <a:scrgbClr r="0" g="0" b="0"/>
+        </a:lnRef>
+        <a:fillRef idx="0">
+          <a:scrgbClr r="0" g="0" b="0"/>
+        </a:fillRef>
+        <a:effectRef idx="0">
+          <a:scrgbClr r="0" g="0" b="0"/>
+        </a:effectRef>
         <a:fontRef idx="none"/>
       </a:style>
     </a:lnDef>
@@ -5658,7 +6217,7 @@
         </a:ln>
         <a:effectLst/>
       </a:spPr>
-      <a:bodyPr rot="0" spcFirstLastPara="1" vertOverflow="overflow" horzOverflow="overflow" vert="horz" wrap="square" lIns="45719" tIns="45719" rIns="45719" bIns="45719" numCol="1" spcCol="38100" rtlCol="0" anchor="t" upright="0">
+      <a:bodyPr rot="0" spcFirstLastPara="1" vertOverflow="overflow" horzOverflow="overflow" vert="horz" wrap="square" lIns="45719" tIns="45719" rIns="45719" bIns="45719" numCol="1" spcCol="38100" rtlCol="0" anchor="t">
         <a:spAutoFit/>
       </a:bodyPr>
       <a:lstStyle>
@@ -5677,7 +6236,7 @@
           <a:buFontTx/>
           <a:buNone/>
           <a:tabLst/>
-          <a:defRPr b="0" baseline="0" cap="none" i="0" spc="0" strike="noStrike" sz="1200" u="none" kumimoji="0" normalizeH="0">
+          <a:defRPr kumimoji="0" sz="1200" b="0" i="0" u="none" strike="noStrike" cap="none" spc="0" normalizeH="0" baseline="0">
             <a:ln>
               <a:noFill/>
             </a:ln>
@@ -5707,7 +6266,7 @@
           <a:buFontTx/>
           <a:buNone/>
           <a:tabLst/>
-          <a:defRPr b="0" baseline="0" cap="none" i="0" spc="0" strike="noStrike" sz="1800" u="none" kumimoji="0" normalizeH="0">
+          <a:defRPr kumimoji="0" sz="1800" b="0" i="0" u="none" strike="noStrike" cap="none" spc="0" normalizeH="0" baseline="0">
             <a:ln>
               <a:noFill/>
             </a:ln>
@@ -5733,7 +6292,7 @@
           <a:buFontTx/>
           <a:buNone/>
           <a:tabLst/>
-          <a:defRPr b="0" baseline="0" cap="none" i="0" spc="0" strike="noStrike" sz="1800" u="none" kumimoji="0" normalizeH="0">
+          <a:defRPr kumimoji="0" sz="1800" b="0" i="0" u="none" strike="noStrike" cap="none" spc="0" normalizeH="0" baseline="0">
             <a:ln>
               <a:noFill/>
             </a:ln>
@@ -5759,7 +6318,7 @@
           <a:buFontTx/>
           <a:buNone/>
           <a:tabLst/>
-          <a:defRPr b="0" baseline="0" cap="none" i="0" spc="0" strike="noStrike" sz="1800" u="none" kumimoji="0" normalizeH="0">
+          <a:defRPr kumimoji="0" sz="1800" b="0" i="0" u="none" strike="noStrike" cap="none" spc="0" normalizeH="0" baseline="0">
             <a:ln>
               <a:noFill/>
             </a:ln>
@@ -5785,7 +6344,7 @@
           <a:buFontTx/>
           <a:buNone/>
           <a:tabLst/>
-          <a:defRPr b="0" baseline="0" cap="none" i="0" spc="0" strike="noStrike" sz="1800" u="none" kumimoji="0" normalizeH="0">
+          <a:defRPr kumimoji="0" sz="1800" b="0" i="0" u="none" strike="noStrike" cap="none" spc="0" normalizeH="0" baseline="0">
             <a:ln>
               <a:noFill/>
             </a:ln>
@@ -5811,7 +6370,7 @@
           <a:buFontTx/>
           <a:buNone/>
           <a:tabLst/>
-          <a:defRPr b="0" baseline="0" cap="none" i="0" spc="0" strike="noStrike" sz="1800" u="none" kumimoji="0" normalizeH="0">
+          <a:defRPr kumimoji="0" sz="1800" b="0" i="0" u="none" strike="noStrike" cap="none" spc="0" normalizeH="0" baseline="0">
             <a:ln>
               <a:noFill/>
             </a:ln>
@@ -5837,7 +6396,7 @@
           <a:buFontTx/>
           <a:buNone/>
           <a:tabLst/>
-          <a:defRPr b="0" baseline="0" cap="none" i="0" spc="0" strike="noStrike" sz="1800" u="none" kumimoji="0" normalizeH="0">
+          <a:defRPr kumimoji="0" sz="1800" b="0" i="0" u="none" strike="noStrike" cap="none" spc="0" normalizeH="0" baseline="0">
             <a:ln>
               <a:noFill/>
             </a:ln>
@@ -5863,7 +6422,7 @@
           <a:buFontTx/>
           <a:buNone/>
           <a:tabLst/>
-          <a:defRPr b="0" baseline="0" cap="none" i="0" spc="0" strike="noStrike" sz="1800" u="none" kumimoji="0" normalizeH="0">
+          <a:defRPr kumimoji="0" sz="1800" b="0" i="0" u="none" strike="noStrike" cap="none" spc="0" normalizeH="0" baseline="0">
             <a:ln>
               <a:noFill/>
             </a:ln>
@@ -5889,7 +6448,7 @@
           <a:buFontTx/>
           <a:buNone/>
           <a:tabLst/>
-          <a:defRPr b="0" baseline="0" cap="none" i="0" spc="0" strike="noStrike" sz="1800" u="none" kumimoji="0" normalizeH="0">
+          <a:defRPr kumimoji="0" sz="1800" b="0" i="0" u="none" strike="noStrike" cap="none" spc="0" normalizeH="0" baseline="0">
             <a:ln>
               <a:noFill/>
             </a:ln>
@@ -5915,7 +6474,7 @@
           <a:buFontTx/>
           <a:buNone/>
           <a:tabLst/>
-          <a:defRPr b="0" baseline="0" cap="none" i="0" spc="0" strike="noStrike" sz="1800" u="none" kumimoji="0" normalizeH="0">
+          <a:defRPr kumimoji="0" sz="1800" b="0" i="0" u="none" strike="noStrike" cap="none" spc="0" normalizeH="0" baseline="0">
             <a:ln>
               <a:noFill/>
             </a:ln>
@@ -5928,18 +6487,25 @@
         </a:lvl9pPr>
       </a:lstStyle>
       <a:style>
-        <a:lnRef idx="0"/>
-        <a:fillRef idx="0"/>
-        <a:effectRef idx="0"/>
+        <a:lnRef idx="0">
+          <a:scrgbClr r="0" g="0" b="0"/>
+        </a:lnRef>
+        <a:fillRef idx="0">
+          <a:scrgbClr r="0" g="0" b="0"/>
+        </a:fillRef>
+        <a:effectRef idx="0">
+          <a:scrgbClr r="0" g="0" b="0"/>
+        </a:effectRef>
         <a:fontRef idx="none"/>
       </a:style>
     </a:txDef>
   </a:objectDefaults>
+  <a:extraClrSchemeLst/>
 </a:theme>
 </file>
 
 <file path=ppt/theme/theme2.xml><?xml version="1.0" encoding="utf-8"?>
-<a:theme xmlns:a="http://schemas.openxmlformats.org/drawingml/2006/main" xmlns:r="http://schemas.openxmlformats.org/officeDocument/2006/relationships" name="Default">
+<a:theme xmlns:a="http://schemas.openxmlformats.org/drawingml/2006/main" name="Default">
   <a:themeElements>
     <a:clrScheme name="Default">
       <a:dk1>
@@ -6071,7 +6637,7 @@
         </a:effectStyle>
         <a:effectStyle>
           <a:effectLst>
-            <a:outerShdw sx="100000" sy="100000" kx="0" ky="0" algn="b" rotWithShape="0" blurRad="38100" dist="20000" dir="5400000">
+            <a:outerShdw blurRad="38100" dist="20000" dir="5400000" rotWithShape="0">
               <a:srgbClr val="000000">
                 <a:alpha val="38000"/>
               </a:srgbClr>
@@ -6146,7 +6712,7 @@
         </a:ln>
         <a:effectLst/>
       </a:spPr>
-      <a:bodyPr rot="0" spcFirstLastPara="1" vertOverflow="overflow" horzOverflow="overflow" vert="horz" wrap="square" lIns="45719" tIns="45719" rIns="45719" bIns="45719" numCol="1" spcCol="38100" rtlCol="0" anchor="t" upright="0">
+      <a:bodyPr rot="0" spcFirstLastPara="1" vertOverflow="overflow" horzOverflow="overflow" vert="horz" wrap="square" lIns="45719" tIns="45719" rIns="45719" bIns="45719" numCol="1" spcCol="38100" rtlCol="0" anchor="t">
         <a:spAutoFit/>
       </a:bodyPr>
       <a:lstStyle>
@@ -6165,7 +6731,7 @@
           <a:buFontTx/>
           <a:buNone/>
           <a:tabLst/>
-          <a:defRPr b="0" baseline="0" cap="none" i="0" spc="0" strike="noStrike" sz="1200" u="none" kumimoji="0" normalizeH="0">
+          <a:defRPr kumimoji="0" sz="1200" b="0" i="0" u="none" strike="noStrike" cap="none" spc="0" normalizeH="0" baseline="0">
             <a:ln>
               <a:noFill/>
             </a:ln>
@@ -6195,7 +6761,7 @@
           <a:buFontTx/>
           <a:buNone/>
           <a:tabLst/>
-          <a:defRPr b="0" baseline="0" cap="none" i="0" spc="0" strike="noStrike" sz="1800" u="none" kumimoji="0" normalizeH="0">
+          <a:defRPr kumimoji="0" sz="1800" b="0" i="0" u="none" strike="noStrike" cap="none" spc="0" normalizeH="0" baseline="0">
             <a:ln>
               <a:noFill/>
             </a:ln>
@@ -6221,7 +6787,7 @@
           <a:buFontTx/>
           <a:buNone/>
           <a:tabLst/>
-          <a:defRPr b="0" baseline="0" cap="none" i="0" spc="0" strike="noStrike" sz="1800" u="none" kumimoji="0" normalizeH="0">
+          <a:defRPr kumimoji="0" sz="1800" b="0" i="0" u="none" strike="noStrike" cap="none" spc="0" normalizeH="0" baseline="0">
             <a:ln>
               <a:noFill/>
             </a:ln>
@@ -6247,7 +6813,7 @@
           <a:buFontTx/>
           <a:buNone/>
           <a:tabLst/>
-          <a:defRPr b="0" baseline="0" cap="none" i="0" spc="0" strike="noStrike" sz="1800" u="none" kumimoji="0" normalizeH="0">
+          <a:defRPr kumimoji="0" sz="1800" b="0" i="0" u="none" strike="noStrike" cap="none" spc="0" normalizeH="0" baseline="0">
             <a:ln>
               <a:noFill/>
             </a:ln>
@@ -6273,7 +6839,7 @@
           <a:buFontTx/>
           <a:buNone/>
           <a:tabLst/>
-          <a:defRPr b="0" baseline="0" cap="none" i="0" spc="0" strike="noStrike" sz="1800" u="none" kumimoji="0" normalizeH="0">
+          <a:defRPr kumimoji="0" sz="1800" b="0" i="0" u="none" strike="noStrike" cap="none" spc="0" normalizeH="0" baseline="0">
             <a:ln>
               <a:noFill/>
             </a:ln>
@@ -6299,7 +6865,7 @@
           <a:buFontTx/>
           <a:buNone/>
           <a:tabLst/>
-          <a:defRPr b="0" baseline="0" cap="none" i="0" spc="0" strike="noStrike" sz="1800" u="none" kumimoji="0" normalizeH="0">
+          <a:defRPr kumimoji="0" sz="1800" b="0" i="0" u="none" strike="noStrike" cap="none" spc="0" normalizeH="0" baseline="0">
             <a:ln>
               <a:noFill/>
             </a:ln>
@@ -6325,7 +6891,7 @@
           <a:buFontTx/>
           <a:buNone/>
           <a:tabLst/>
-          <a:defRPr b="0" baseline="0" cap="none" i="0" spc="0" strike="noStrike" sz="1800" u="none" kumimoji="0" normalizeH="0">
+          <a:defRPr kumimoji="0" sz="1800" b="0" i="0" u="none" strike="noStrike" cap="none" spc="0" normalizeH="0" baseline="0">
             <a:ln>
               <a:noFill/>
             </a:ln>
@@ -6351,7 +6917,7 @@
           <a:buFontTx/>
           <a:buNone/>
           <a:tabLst/>
-          <a:defRPr b="0" baseline="0" cap="none" i="0" spc="0" strike="noStrike" sz="1800" u="none" kumimoji="0" normalizeH="0">
+          <a:defRPr kumimoji="0" sz="1800" b="0" i="0" u="none" strike="noStrike" cap="none" spc="0" normalizeH="0" baseline="0">
             <a:ln>
               <a:noFill/>
             </a:ln>
@@ -6377,7 +6943,7 @@
           <a:buFontTx/>
           <a:buNone/>
           <a:tabLst/>
-          <a:defRPr b="0" baseline="0" cap="none" i="0" spc="0" strike="noStrike" sz="1800" u="none" kumimoji="0" normalizeH="0">
+          <a:defRPr kumimoji="0" sz="1800" b="0" i="0" u="none" strike="noStrike" cap="none" spc="0" normalizeH="0" baseline="0">
             <a:ln>
               <a:noFill/>
             </a:ln>
@@ -6403,7 +6969,7 @@
           <a:buFontTx/>
           <a:buNone/>
           <a:tabLst/>
-          <a:defRPr b="0" baseline="0" cap="none" i="0" spc="0" strike="noStrike" sz="1800" u="none" kumimoji="0" normalizeH="0">
+          <a:defRPr kumimoji="0" sz="1800" b="0" i="0" u="none" strike="noStrike" cap="none" spc="0" normalizeH="0" baseline="0">
             <a:ln>
               <a:noFill/>
             </a:ln>
@@ -6416,9 +6982,15 @@
         </a:lvl9pPr>
       </a:lstStyle>
       <a:style>
-        <a:lnRef idx="0"/>
-        <a:fillRef idx="0"/>
-        <a:effectRef idx="0"/>
+        <a:lnRef idx="0">
+          <a:scrgbClr r="0" g="0" b="0"/>
+        </a:lnRef>
+        <a:fillRef idx="0">
+          <a:scrgbClr r="0" g="0" b="0"/>
+        </a:fillRef>
+        <a:effectRef idx="0">
+          <a:scrgbClr r="0" g="0" b="0"/>
+        </a:effectRef>
         <a:fontRef idx="none"/>
       </a:style>
     </a:spDef>
@@ -6433,14 +7005,14 @@
           <a:bevel/>
         </a:ln>
         <a:effectLst>
-          <a:outerShdw sx="100000" sy="100000" kx="0" ky="0" algn="b" rotWithShape="0" blurRad="38100" dist="20000" dir="5400000">
+          <a:outerShdw blurRad="38100" dist="20000" dir="5400000" rotWithShape="0">
             <a:srgbClr val="000000">
               <a:alpha val="38000"/>
             </a:srgbClr>
           </a:outerShdw>
         </a:effectLst>
       </a:spPr>
-      <a:bodyPr rot="0" spcFirstLastPara="1" vertOverflow="overflow" horzOverflow="overflow" vert="horz" wrap="square" lIns="91439" tIns="45719" rIns="91439" bIns="45719" numCol="1" spcCol="38100" rtlCol="0" anchor="t" upright="0">
+      <a:bodyPr rot="0" spcFirstLastPara="1" vertOverflow="overflow" horzOverflow="overflow" vert="horz" wrap="square" lIns="91439" tIns="45719" rIns="91439" bIns="45719" numCol="1" spcCol="38100" rtlCol="0" anchor="t">
         <a:noAutofit/>
       </a:bodyPr>
       <a:lstStyle>
@@ -6459,7 +7031,7 @@
           <a:buFontTx/>
           <a:buNone/>
           <a:tabLst/>
-          <a:defRPr b="0" baseline="0" cap="none" i="0" spc="0" strike="noStrike" sz="1800" u="none" kumimoji="0" normalizeH="0">
+          <a:defRPr kumimoji="0" sz="1800" b="0" i="0" u="none" strike="noStrike" cap="none" spc="0" normalizeH="0" baseline="0">
             <a:ln>
               <a:noFill/>
             </a:ln>
@@ -6485,7 +7057,7 @@
           <a:buFontTx/>
           <a:buNone/>
           <a:tabLst/>
-          <a:defRPr b="0" baseline="0" cap="none" i="0" spc="0" strike="noStrike" sz="1800" u="none" kumimoji="0" normalizeH="0">
+          <a:defRPr kumimoji="0" sz="1800" b="0" i="0" u="none" strike="noStrike" cap="none" spc="0" normalizeH="0" baseline="0">
             <a:ln>
               <a:noFill/>
             </a:ln>
@@ -6511,7 +7083,7 @@
           <a:buFontTx/>
           <a:buNone/>
           <a:tabLst/>
-          <a:defRPr b="0" baseline="0" cap="none" i="0" spc="0" strike="noStrike" sz="1800" u="none" kumimoji="0" normalizeH="0">
+          <a:defRPr kumimoji="0" sz="1800" b="0" i="0" u="none" strike="noStrike" cap="none" spc="0" normalizeH="0" baseline="0">
             <a:ln>
               <a:noFill/>
             </a:ln>
@@ -6537,7 +7109,7 @@
           <a:buFontTx/>
           <a:buNone/>
           <a:tabLst/>
-          <a:defRPr b="0" baseline="0" cap="none" i="0" spc="0" strike="noStrike" sz="1800" u="none" kumimoji="0" normalizeH="0">
+          <a:defRPr kumimoji="0" sz="1800" b="0" i="0" u="none" strike="noStrike" cap="none" spc="0" normalizeH="0" baseline="0">
             <a:ln>
               <a:noFill/>
             </a:ln>
@@ -6563,7 +7135,7 @@
           <a:buFontTx/>
           <a:buNone/>
           <a:tabLst/>
-          <a:defRPr b="0" baseline="0" cap="none" i="0" spc="0" strike="noStrike" sz="1800" u="none" kumimoji="0" normalizeH="0">
+          <a:defRPr kumimoji="0" sz="1800" b="0" i="0" u="none" strike="noStrike" cap="none" spc="0" normalizeH="0" baseline="0">
             <a:ln>
               <a:noFill/>
             </a:ln>
@@ -6589,7 +7161,7 @@
           <a:buFontTx/>
           <a:buNone/>
           <a:tabLst/>
-          <a:defRPr b="0" baseline="0" cap="none" i="0" spc="0" strike="noStrike" sz="1800" u="none" kumimoji="0" normalizeH="0">
+          <a:defRPr kumimoji="0" sz="1800" b="0" i="0" u="none" strike="noStrike" cap="none" spc="0" normalizeH="0" baseline="0">
             <a:ln>
               <a:noFill/>
             </a:ln>
@@ -6615,7 +7187,7 @@
           <a:buFontTx/>
           <a:buNone/>
           <a:tabLst/>
-          <a:defRPr b="0" baseline="0" cap="none" i="0" spc="0" strike="noStrike" sz="1800" u="none" kumimoji="0" normalizeH="0">
+          <a:defRPr kumimoji="0" sz="1800" b="0" i="0" u="none" strike="noStrike" cap="none" spc="0" normalizeH="0" baseline="0">
             <a:ln>
               <a:noFill/>
             </a:ln>
@@ -6641,7 +7213,7 @@
           <a:buFontTx/>
           <a:buNone/>
           <a:tabLst/>
-          <a:defRPr b="0" baseline="0" cap="none" i="0" spc="0" strike="noStrike" sz="1800" u="none" kumimoji="0" normalizeH="0">
+          <a:defRPr kumimoji="0" sz="1800" b="0" i="0" u="none" strike="noStrike" cap="none" spc="0" normalizeH="0" baseline="0">
             <a:ln>
               <a:noFill/>
             </a:ln>
@@ -6667,7 +7239,7 @@
           <a:buFontTx/>
           <a:buNone/>
           <a:tabLst/>
-          <a:defRPr b="0" baseline="0" cap="none" i="0" spc="0" strike="noStrike" sz="1800" u="none" kumimoji="0" normalizeH="0">
+          <a:defRPr kumimoji="0" sz="1800" b="0" i="0" u="none" strike="noStrike" cap="none" spc="0" normalizeH="0" baseline="0">
             <a:ln>
               <a:noFill/>
             </a:ln>
@@ -6693,7 +7265,7 @@
           <a:buFontTx/>
           <a:buNone/>
           <a:tabLst/>
-          <a:defRPr b="0" baseline="0" cap="none" i="0" spc="0" strike="noStrike" sz="1800" u="none" kumimoji="0" normalizeH="0">
+          <a:defRPr kumimoji="0" sz="1800" b="0" i="0" u="none" strike="noStrike" cap="none" spc="0" normalizeH="0" baseline="0">
             <a:ln>
               <a:noFill/>
             </a:ln>
@@ -6706,9 +7278,15 @@
         </a:lvl9pPr>
       </a:lstStyle>
       <a:style>
-        <a:lnRef idx="0"/>
-        <a:fillRef idx="0"/>
-        <a:effectRef idx="0"/>
+        <a:lnRef idx="0">
+          <a:scrgbClr r="0" g="0" b="0"/>
+        </a:lnRef>
+        <a:fillRef idx="0">
+          <a:scrgbClr r="0" g="0" b="0"/>
+        </a:fillRef>
+        <a:effectRef idx="0">
+          <a:scrgbClr r="0" g="0" b="0"/>
+        </a:effectRef>
         <a:fontRef idx="none"/>
       </a:style>
     </a:lnDef>
@@ -6721,7 +7299,7 @@
         </a:ln>
         <a:effectLst/>
       </a:spPr>
-      <a:bodyPr rot="0" spcFirstLastPara="1" vertOverflow="overflow" horzOverflow="overflow" vert="horz" wrap="square" lIns="45719" tIns="45719" rIns="45719" bIns="45719" numCol="1" spcCol="38100" rtlCol="0" anchor="t" upright="0">
+      <a:bodyPr rot="0" spcFirstLastPara="1" vertOverflow="overflow" horzOverflow="overflow" vert="horz" wrap="square" lIns="45719" tIns="45719" rIns="45719" bIns="45719" numCol="1" spcCol="38100" rtlCol="0" anchor="t">
         <a:spAutoFit/>
       </a:bodyPr>
       <a:lstStyle>
@@ -6740,7 +7318,7 @@
           <a:buFontTx/>
           <a:buNone/>
           <a:tabLst/>
-          <a:defRPr b="0" baseline="0" cap="none" i="0" spc="0" strike="noStrike" sz="1200" u="none" kumimoji="0" normalizeH="0">
+          <a:defRPr kumimoji="0" sz="1200" b="0" i="0" u="none" strike="noStrike" cap="none" spc="0" normalizeH="0" baseline="0">
             <a:ln>
               <a:noFill/>
             </a:ln>
@@ -6770,7 +7348,7 @@
           <a:buFontTx/>
           <a:buNone/>
           <a:tabLst/>
-          <a:defRPr b="0" baseline="0" cap="none" i="0" spc="0" strike="noStrike" sz="1800" u="none" kumimoji="0" normalizeH="0">
+          <a:defRPr kumimoji="0" sz="1800" b="0" i="0" u="none" strike="noStrike" cap="none" spc="0" normalizeH="0" baseline="0">
             <a:ln>
               <a:noFill/>
             </a:ln>
@@ -6796,7 +7374,7 @@
           <a:buFontTx/>
           <a:buNone/>
           <a:tabLst/>
-          <a:defRPr b="0" baseline="0" cap="none" i="0" spc="0" strike="noStrike" sz="1800" u="none" kumimoji="0" normalizeH="0">
+          <a:defRPr kumimoji="0" sz="1800" b="0" i="0" u="none" strike="noStrike" cap="none" spc="0" normalizeH="0" baseline="0">
             <a:ln>
               <a:noFill/>
             </a:ln>
@@ -6822,7 +7400,7 @@
           <a:buFontTx/>
           <a:buNone/>
           <a:tabLst/>
-          <a:defRPr b="0" baseline="0" cap="none" i="0" spc="0" strike="noStrike" sz="1800" u="none" kumimoji="0" normalizeH="0">
+          <a:defRPr kumimoji="0" sz="1800" b="0" i="0" u="none" strike="noStrike" cap="none" spc="0" normalizeH="0" baseline="0">
             <a:ln>
               <a:noFill/>
             </a:ln>
@@ -6848,7 +7426,7 @@
           <a:buFontTx/>
           <a:buNone/>
           <a:tabLst/>
-          <a:defRPr b="0" baseline="0" cap="none" i="0" spc="0" strike="noStrike" sz="1800" u="none" kumimoji="0" normalizeH="0">
+          <a:defRPr kumimoji="0" sz="1800" b="0" i="0" u="none" strike="noStrike" cap="none" spc="0" normalizeH="0" baseline="0">
             <a:ln>
               <a:noFill/>
             </a:ln>
@@ -6874,7 +7452,7 @@
           <a:buFontTx/>
           <a:buNone/>
           <a:tabLst/>
-          <a:defRPr b="0" baseline="0" cap="none" i="0" spc="0" strike="noStrike" sz="1800" u="none" kumimoji="0" normalizeH="0">
+          <a:defRPr kumimoji="0" sz="1800" b="0" i="0" u="none" strike="noStrike" cap="none" spc="0" normalizeH="0" baseline="0">
             <a:ln>
               <a:noFill/>
             </a:ln>
@@ -6900,7 +7478,7 @@
           <a:buFontTx/>
           <a:buNone/>
           <a:tabLst/>
-          <a:defRPr b="0" baseline="0" cap="none" i="0" spc="0" strike="noStrike" sz="1800" u="none" kumimoji="0" normalizeH="0">
+          <a:defRPr kumimoji="0" sz="1800" b="0" i="0" u="none" strike="noStrike" cap="none" spc="0" normalizeH="0" baseline="0">
             <a:ln>
               <a:noFill/>
             </a:ln>
@@ -6926,7 +7504,7 @@
           <a:buFontTx/>
           <a:buNone/>
           <a:tabLst/>
-          <a:defRPr b="0" baseline="0" cap="none" i="0" spc="0" strike="noStrike" sz="1800" u="none" kumimoji="0" normalizeH="0">
+          <a:defRPr kumimoji="0" sz="1800" b="0" i="0" u="none" strike="noStrike" cap="none" spc="0" normalizeH="0" baseline="0">
             <a:ln>
               <a:noFill/>
             </a:ln>
@@ -6952,7 +7530,7 @@
           <a:buFontTx/>
           <a:buNone/>
           <a:tabLst/>
-          <a:defRPr b="0" baseline="0" cap="none" i="0" spc="0" strike="noStrike" sz="1800" u="none" kumimoji="0" normalizeH="0">
+          <a:defRPr kumimoji="0" sz="1800" b="0" i="0" u="none" strike="noStrike" cap="none" spc="0" normalizeH="0" baseline="0">
             <a:ln>
               <a:noFill/>
             </a:ln>
@@ -6978,7 +7556,7 @@
           <a:buFontTx/>
           <a:buNone/>
           <a:tabLst/>
-          <a:defRPr b="0" baseline="0" cap="none" i="0" spc="0" strike="noStrike" sz="1800" u="none" kumimoji="0" normalizeH="0">
+          <a:defRPr kumimoji="0" sz="1800" b="0" i="0" u="none" strike="noStrike" cap="none" spc="0" normalizeH="0" baseline="0">
             <a:ln>
               <a:noFill/>
             </a:ln>
@@ -6991,12 +7569,19 @@
         </a:lvl9pPr>
       </a:lstStyle>
       <a:style>
-        <a:lnRef idx="0"/>
-        <a:fillRef idx="0"/>
-        <a:effectRef idx="0"/>
+        <a:lnRef idx="0">
+          <a:scrgbClr r="0" g="0" b="0"/>
+        </a:lnRef>
+        <a:fillRef idx="0">
+          <a:scrgbClr r="0" g="0" b="0"/>
+        </a:fillRef>
+        <a:effectRef idx="0">
+          <a:scrgbClr r="0" g="0" b="0"/>
+        </a:effectRef>
         <a:fontRef idx="none"/>
       </a:style>
     </a:txDef>
   </a:objectDefaults>
+  <a:extraClrSchemeLst/>
 </a:theme>
 </file>
</xml_diff>